<commit_message>
release for 2019/01/23 meetup
</commit_message>
<xml_diff>
--- a/20190123.MessageQueueRPC/91APP-MessageQueueRPC-20190123.pptx
+++ b/20190123.MessageQueueRPC/91APP-MessageQueueRPC-20190123.pptx
@@ -8,7 +8,7 @@
     <p:sldMasterId id="2147483690" r:id="rId4"/>
   </p:sldMasterIdLst>
   <p:notesMasterIdLst>
-    <p:notesMasterId r:id="rId33"/>
+    <p:notesMasterId r:id="rId40"/>
   </p:notesMasterIdLst>
   <p:sldIdLst>
     <p:sldId id="447" r:id="rId5"/>
@@ -30,15 +30,22 @@
     <p:sldId id="540" r:id="rId21"/>
     <p:sldId id="536" r:id="rId22"/>
     <p:sldId id="526" r:id="rId23"/>
-    <p:sldId id="541" r:id="rId24"/>
-    <p:sldId id="542" r:id="rId25"/>
-    <p:sldId id="543" r:id="rId26"/>
-    <p:sldId id="544" r:id="rId27"/>
-    <p:sldId id="545" r:id="rId28"/>
+    <p:sldId id="550" r:id="rId24"/>
+    <p:sldId id="551" r:id="rId25"/>
+    <p:sldId id="552" r:id="rId26"/>
+    <p:sldId id="541" r:id="rId27"/>
+    <p:sldId id="542" r:id="rId28"/>
     <p:sldId id="546" r:id="rId29"/>
-    <p:sldId id="547" r:id="rId30"/>
-    <p:sldId id="548" r:id="rId31"/>
-    <p:sldId id="448" r:id="rId32"/>
+    <p:sldId id="543" r:id="rId30"/>
+    <p:sldId id="544" r:id="rId31"/>
+    <p:sldId id="545" r:id="rId32"/>
+    <p:sldId id="554" r:id="rId33"/>
+    <p:sldId id="553" r:id="rId34"/>
+    <p:sldId id="555" r:id="rId35"/>
+    <p:sldId id="548" r:id="rId36"/>
+    <p:sldId id="556" r:id="rId37"/>
+    <p:sldId id="557" r:id="rId38"/>
+    <p:sldId id="448" r:id="rId39"/>
   </p:sldIdLst>
   <p:sldSz cx="9144000" cy="5143500" type="screen16x9"/>
   <p:notesSz cx="6858000" cy="9144000"/>
@@ -784,6 +791,67 @@
 </p:notes>
 </file>
 
+<file path=ppt/notesSlides/notesSlide10.xml><?xml version="1.0" encoding="utf-8"?>
+<p:notes xmlns:a="http://schemas.openxmlformats.org/drawingml/2006/main" xmlns:r="http://schemas.openxmlformats.org/officeDocument/2006/relationships" xmlns:p="http://schemas.openxmlformats.org/presentationml/2006/main">
+  <p:cSld>
+    <p:spTree>
+      <p:nvGrpSpPr>
+        <p:cNvPr id="1" name=""/>
+        <p:cNvGrpSpPr/>
+        <p:nvPr/>
+      </p:nvGrpSpPr>
+      <p:grpSpPr>
+        <a:xfrm>
+          <a:off x="0" y="0"/>
+          <a:ext cx="0" cy="0"/>
+          <a:chOff x="0" y="0"/>
+          <a:chExt cx="0" cy="0"/>
+        </a:xfrm>
+      </p:grpSpPr>
+      <p:sp>
+        <p:nvSpPr>
+          <p:cNvPr id="2" name="投影片影像版面配置區 1"/>
+          <p:cNvSpPr>
+            <a:spLocks noGrp="1" noRot="1" noChangeAspect="1"/>
+          </p:cNvSpPr>
+          <p:nvPr>
+            <p:ph type="sldImg"/>
+          </p:nvPr>
+        </p:nvSpPr>
+        <p:spPr/>
+      </p:sp>
+      <p:sp>
+        <p:nvSpPr>
+          <p:cNvPr id="3" name="備忘稿版面配置區 2"/>
+          <p:cNvSpPr>
+            <a:spLocks noGrp="1"/>
+          </p:cNvSpPr>
+          <p:nvPr>
+            <p:ph type="body" idx="1"/>
+          </p:nvPr>
+        </p:nvSpPr>
+        <p:spPr/>
+        <p:txBody>
+          <a:bodyPr/>
+          <a:lstStyle/>
+          <a:p>
+            <a:endParaRPr lang="zh-TW" altLang="en-US"/>
+          </a:p>
+        </p:txBody>
+      </p:sp>
+    </p:spTree>
+    <p:extLst>
+      <p:ext uri="{BB962C8B-B14F-4D97-AF65-F5344CB8AC3E}">
+        <p14:creationId xmlns:p14="http://schemas.microsoft.com/office/powerpoint/2010/main" val="206863554"/>
+      </p:ext>
+    </p:extLst>
+  </p:cSld>
+  <p:clrMapOvr>
+    <a:masterClrMapping/>
+  </p:clrMapOvr>
+</p:notes>
+</file>
+
 <file path=ppt/notesSlides/notesSlide2.xml><?xml version="1.0" encoding="utf-8"?>
 <p:notes xmlns:a="http://schemas.openxmlformats.org/drawingml/2006/main" xmlns:r="http://schemas.openxmlformats.org/officeDocument/2006/relationships" xmlns:p="http://schemas.openxmlformats.org/presentationml/2006/main">
   <p:cSld>
@@ -1399,7 +1467,12 @@
             <p:ph type="sldImg"/>
           </p:nvPr>
         </p:nvSpPr>
-        <p:spPr/>
+        <p:spPr>
+          <a:xfrm>
+            <a:off x="381000" y="685800"/>
+            <a:ext cx="6096000" cy="3429000"/>
+          </a:xfrm>
+        </p:spPr>
       </p:sp>
       <p:sp>
         <p:nvSpPr>
@@ -1416,14 +1489,24 @@
           <a:bodyPr/>
           <a:lstStyle/>
           <a:p>
-            <a:endParaRPr lang="zh-TW" altLang="en-US"/>
+            <a:r>
+              <a:rPr lang="en-US" altLang="zh-TW" dirty="0"/>
+              <a:t>DEMO worker thread count effect</a:t>
+            </a:r>
+          </a:p>
+          <a:p>
+            <a:r>
+              <a:rPr lang="en-US" altLang="zh-TW" dirty="0"/>
+              <a:t>DEMO manual / auto reset event</a:t>
+            </a:r>
+            <a:endParaRPr lang="zh-TW" altLang="en-US" dirty="0"/>
           </a:p>
         </p:txBody>
       </p:sp>
     </p:spTree>
     <p:extLst>
       <p:ext uri="{BB962C8B-B14F-4D97-AF65-F5344CB8AC3E}">
-        <p14:creationId xmlns:p14="http://schemas.microsoft.com/office/powerpoint/2010/main" val="206863554"/>
+        <p14:creationId xmlns:p14="http://schemas.microsoft.com/office/powerpoint/2010/main" val="2344158448"/>
       </p:ext>
     </p:extLst>
   </p:cSld>
@@ -16575,7 +16658,7 @@
           <p:cNvPr id="4" name="標題 3">
             <a:extLst>
               <a:ext uri="{FF2B5EF4-FFF2-40B4-BE49-F238E27FC236}">
-                <a16:creationId xmlns:a16="http://schemas.microsoft.com/office/drawing/2014/main" id="{7DB22D88-1A93-4EC1-9D9A-996FB55606EA}"/>
+                <a16:creationId xmlns:a16="http://schemas.microsoft.com/office/drawing/2014/main" id="{27507480-CCCA-4F58-AF49-32DD02145879}"/>
               </a:ext>
             </a:extLst>
           </p:cNvPr>
@@ -16592,9 +16675,10 @@
           <a:lstStyle/>
           <a:p>
             <a:r>
-              <a:rPr lang="en-US" dirty="0"/>
-              <a:t>Async / Await &amp; Parallel Process…</a:t>
-            </a:r>
+              <a:rPr lang="en-US" altLang="zh-TW" dirty="0"/>
+              <a:t>What Architect Thinks…</a:t>
+            </a:r>
+            <a:endParaRPr lang="zh-TW" altLang="en-US" dirty="0"/>
           </a:p>
         </p:txBody>
       </p:sp>
@@ -16603,7 +16687,7 @@
           <p:cNvPr id="5" name="文字版面配置區 4">
             <a:extLst>
               <a:ext uri="{FF2B5EF4-FFF2-40B4-BE49-F238E27FC236}">
-                <a16:creationId xmlns:a16="http://schemas.microsoft.com/office/drawing/2014/main" id="{D5E6A227-FFA5-4259-A31A-D3FFAE2305C9}"/>
+                <a16:creationId xmlns:a16="http://schemas.microsoft.com/office/drawing/2014/main" id="{86DAF298-0875-43C1-89F8-B52893228D8D}"/>
               </a:ext>
             </a:extLst>
           </p:cNvPr>
@@ -16620,30 +16704,31 @@
           <a:lstStyle/>
           <a:p>
             <a:r>
-              <a:rPr lang="en-US" dirty="0"/>
-              <a:t>Basic Skill: Thread Sync</a:t>
+              <a:rPr lang="en-US" altLang="zh-TW" dirty="0"/>
+              <a:t>Async (Notify, not Pooling)</a:t>
+            </a:r>
+          </a:p>
+          <a:p>
+            <a:endParaRPr lang="en-US" altLang="zh-TW" dirty="0"/>
+          </a:p>
+          <a:p>
+            <a:r>
+              <a:rPr lang="en-US" altLang="zh-TW" dirty="0"/>
+              <a:t>Parallel Processing</a:t>
             </a:r>
           </a:p>
           <a:p>
             <a:pPr lvl="1"/>
             <a:r>
-              <a:rPr lang="en-US" dirty="0" err="1"/>
-              <a:t>ManualResetEvent</a:t>
-            </a:r>
-            <a:endParaRPr lang="en-US" dirty="0"/>
+              <a:rPr lang="en-US" altLang="zh-TW" dirty="0"/>
+              <a:t>Inside Worker – threading, synchronize</a:t>
+            </a:r>
           </a:p>
           <a:p>
             <a:pPr lvl="1"/>
             <a:r>
-              <a:rPr lang="en-US" dirty="0" err="1"/>
-              <a:t>AutoResetEvent</a:t>
-            </a:r>
-            <a:endParaRPr lang="en-US" dirty="0"/>
-          </a:p>
-          <a:p>
-            <a:r>
-              <a:rPr lang="en-US" dirty="0"/>
-              <a:t>C# Async Wrap</a:t>
+              <a:rPr lang="en-US" altLang="zh-TW" dirty="0"/>
+              <a:t>Outside Worker – graceful shutdown &amp; auto scaling</a:t>
             </a:r>
           </a:p>
         </p:txBody>
@@ -16651,7 +16736,7 @@
     </p:spTree>
     <p:extLst>
       <p:ext uri="{BB962C8B-B14F-4D97-AF65-F5344CB8AC3E}">
-        <p14:creationId xmlns:p14="http://schemas.microsoft.com/office/powerpoint/2010/main" val="3561391479"/>
+        <p14:creationId xmlns:p14="http://schemas.microsoft.com/office/powerpoint/2010/main" val="2190119806"/>
       </p:ext>
     </p:extLst>
   </p:cSld>
@@ -16683,6 +16768,354 @@
           <p:cNvPr id="4" name="標題 3">
             <a:extLst>
               <a:ext uri="{FF2B5EF4-FFF2-40B4-BE49-F238E27FC236}">
+                <a16:creationId xmlns:a16="http://schemas.microsoft.com/office/drawing/2014/main" id="{27507480-CCCA-4F58-AF49-32DD02145879}"/>
+              </a:ext>
+            </a:extLst>
+          </p:cNvPr>
+          <p:cNvSpPr>
+            <a:spLocks noGrp="1"/>
+          </p:cNvSpPr>
+          <p:nvPr>
+            <p:ph type="title"/>
+          </p:nvPr>
+        </p:nvSpPr>
+        <p:spPr/>
+        <p:txBody>
+          <a:bodyPr/>
+          <a:lstStyle/>
+          <a:p>
+            <a:r>
+              <a:rPr lang="en-US" altLang="zh-TW" dirty="0"/>
+              <a:t>Synchronize Basic:</a:t>
+            </a:r>
+            <a:endParaRPr lang="zh-TW" altLang="en-US" dirty="0"/>
+          </a:p>
+        </p:txBody>
+      </p:sp>
+      <p:sp>
+        <p:nvSpPr>
+          <p:cNvPr id="5" name="文字版面配置區 4">
+            <a:extLst>
+              <a:ext uri="{FF2B5EF4-FFF2-40B4-BE49-F238E27FC236}">
+                <a16:creationId xmlns:a16="http://schemas.microsoft.com/office/drawing/2014/main" id="{86DAF298-0875-43C1-89F8-B52893228D8D}"/>
+              </a:ext>
+            </a:extLst>
+          </p:cNvPr>
+          <p:cNvSpPr>
+            <a:spLocks noGrp="1"/>
+          </p:cNvSpPr>
+          <p:nvPr>
+            <p:ph type="body" idx="1"/>
+          </p:nvPr>
+        </p:nvSpPr>
+        <p:spPr/>
+        <p:txBody>
+          <a:bodyPr/>
+          <a:lstStyle/>
+          <a:p>
+            <a:r>
+              <a:rPr lang="en-US" altLang="zh-TW" dirty="0" err="1"/>
+              <a:t>WaitHandle</a:t>
+            </a:r>
+            <a:r>
+              <a:rPr lang="en-US" altLang="zh-TW" dirty="0"/>
+              <a:t> [</a:t>
+            </a:r>
+            <a:r>
+              <a:rPr lang="en-US" altLang="zh-TW" dirty="0">
+                <a:hlinkClick r:id="rId2"/>
+              </a:rPr>
+              <a:t>docs</a:t>
+            </a:r>
+            <a:r>
+              <a:rPr lang="en-US" altLang="zh-TW" dirty="0"/>
+              <a:t>]</a:t>
+            </a:r>
+          </a:p>
+        </p:txBody>
+      </p:sp>
+      <p:pic>
+        <p:nvPicPr>
+          <p:cNvPr id="2" name="圖片 1">
+            <a:extLst>
+              <a:ext uri="{FF2B5EF4-FFF2-40B4-BE49-F238E27FC236}">
+                <a16:creationId xmlns:a16="http://schemas.microsoft.com/office/drawing/2014/main" id="{065C5146-1D6B-4477-8EF0-3D4423EA4AE1}"/>
+              </a:ext>
+            </a:extLst>
+          </p:cNvPr>
+          <p:cNvPicPr>
+            <a:picLocks noChangeAspect="1"/>
+          </p:cNvPicPr>
+          <p:nvPr/>
+        </p:nvPicPr>
+        <p:blipFill>
+          <a:blip r:embed="rId3"/>
+          <a:stretch>
+            <a:fillRect/>
+          </a:stretch>
+        </p:blipFill>
+        <p:spPr>
+          <a:xfrm>
+            <a:off x="457200" y="1255416"/>
+            <a:ext cx="5631811" cy="3682106"/>
+          </a:xfrm>
+          <a:prstGeom prst="rect">
+            <a:avLst/>
+          </a:prstGeom>
+        </p:spPr>
+      </p:pic>
+      <p:sp>
+        <p:nvSpPr>
+          <p:cNvPr id="3" name="矩形 2">
+            <a:extLst>
+              <a:ext uri="{FF2B5EF4-FFF2-40B4-BE49-F238E27FC236}">
+                <a16:creationId xmlns:a16="http://schemas.microsoft.com/office/drawing/2014/main" id="{75ED5241-4976-4D26-9BCC-47FD0E4E0744}"/>
+              </a:ext>
+            </a:extLst>
+          </p:cNvPr>
+          <p:cNvSpPr/>
+          <p:nvPr/>
+        </p:nvSpPr>
+        <p:spPr>
+          <a:xfrm>
+            <a:off x="-77491" y="4881890"/>
+            <a:ext cx="8841783" cy="523220"/>
+          </a:xfrm>
+          <a:prstGeom prst="rect">
+            <a:avLst/>
+          </a:prstGeom>
+        </p:spPr>
+        <p:txBody>
+          <a:bodyPr wrap="square">
+            <a:spAutoFit/>
+          </a:bodyPr>
+          <a:lstStyle/>
+          <a:p>
+            <a:r>
+              <a:rPr lang="zh-TW" altLang="en-US" dirty="0">
+                <a:hlinkClick r:id="rId2"/>
+              </a:rPr>
+              <a:t>https://docs.microsoft.com/zh-tw/dotnet/api/system.threading.waithandle?view=netframework-4.7.2</a:t>
+            </a:r>
+            <a:endParaRPr lang="en-US" altLang="zh-TW" dirty="0"/>
+          </a:p>
+          <a:p>
+            <a:endParaRPr lang="zh-TW" altLang="en-US" dirty="0"/>
+          </a:p>
+        </p:txBody>
+      </p:sp>
+    </p:spTree>
+    <p:extLst>
+      <p:ext uri="{BB962C8B-B14F-4D97-AF65-F5344CB8AC3E}">
+        <p14:creationId xmlns:p14="http://schemas.microsoft.com/office/powerpoint/2010/main" val="4167995745"/>
+      </p:ext>
+    </p:extLst>
+  </p:cSld>
+  <p:clrMapOvr>
+    <a:masterClrMapping/>
+  </p:clrMapOvr>
+</p:sld>
+</file>
+
+<file path=ppt/slides/slide22.xml><?xml version="1.0" encoding="utf-8"?>
+<p:sld xmlns:a="http://schemas.openxmlformats.org/drawingml/2006/main" xmlns:r="http://schemas.openxmlformats.org/officeDocument/2006/relationships" xmlns:p="http://schemas.openxmlformats.org/presentationml/2006/main">
+  <p:cSld>
+    <p:spTree>
+      <p:nvGrpSpPr>
+        <p:cNvPr id="1" name=""/>
+        <p:cNvGrpSpPr/>
+        <p:nvPr/>
+      </p:nvGrpSpPr>
+      <p:grpSpPr>
+        <a:xfrm>
+          <a:off x="0" y="0"/>
+          <a:ext cx="0" cy="0"/>
+          <a:chOff x="0" y="0"/>
+          <a:chExt cx="0" cy="0"/>
+        </a:xfrm>
+      </p:grpSpPr>
+      <p:sp>
+        <p:nvSpPr>
+          <p:cNvPr id="2" name="標題 1">
+            <a:extLst>
+              <a:ext uri="{FF2B5EF4-FFF2-40B4-BE49-F238E27FC236}">
+                <a16:creationId xmlns:a16="http://schemas.microsoft.com/office/drawing/2014/main" id="{D7B22318-03C7-42EB-A654-0549C0638542}"/>
+              </a:ext>
+            </a:extLst>
+          </p:cNvPr>
+          <p:cNvSpPr>
+            <a:spLocks noGrp="1"/>
+          </p:cNvSpPr>
+          <p:nvPr>
+            <p:ph type="ctrTitle"/>
+          </p:nvPr>
+        </p:nvSpPr>
+        <p:spPr/>
+        <p:txBody>
+          <a:bodyPr/>
+          <a:lstStyle/>
+          <a:p>
+            <a:r>
+              <a:rPr lang="en-US" altLang="zh-TW" dirty="0"/>
+              <a:t>Demo #3</a:t>
+            </a:r>
+            <a:endParaRPr lang="zh-TW" altLang="en-US" dirty="0"/>
+          </a:p>
+        </p:txBody>
+      </p:sp>
+      <p:sp>
+        <p:nvSpPr>
+          <p:cNvPr id="3" name="副標題 2">
+            <a:extLst>
+              <a:ext uri="{FF2B5EF4-FFF2-40B4-BE49-F238E27FC236}">
+                <a16:creationId xmlns:a16="http://schemas.microsoft.com/office/drawing/2014/main" id="{564BFE7D-4A65-418C-97B8-CB5A74CABC17}"/>
+              </a:ext>
+            </a:extLst>
+          </p:cNvPr>
+          <p:cNvSpPr>
+            <a:spLocks noGrp="1"/>
+          </p:cNvSpPr>
+          <p:nvPr>
+            <p:ph type="subTitle" idx="1"/>
+          </p:nvPr>
+        </p:nvSpPr>
+        <p:spPr/>
+        <p:txBody>
+          <a:bodyPr/>
+          <a:lstStyle/>
+          <a:p>
+            <a:r>
+              <a:rPr lang="en-US" altLang="zh-TW" dirty="0" err="1"/>
+              <a:t>ThreadSyncDemo</a:t>
+            </a:r>
+            <a:endParaRPr lang="zh-TW" altLang="en-US" dirty="0"/>
+          </a:p>
+        </p:txBody>
+      </p:sp>
+    </p:spTree>
+    <p:extLst>
+      <p:ext uri="{BB962C8B-B14F-4D97-AF65-F5344CB8AC3E}">
+        <p14:creationId xmlns:p14="http://schemas.microsoft.com/office/powerpoint/2010/main" val="804983065"/>
+      </p:ext>
+    </p:extLst>
+  </p:cSld>
+  <p:clrMapOvr>
+    <a:masterClrMapping/>
+  </p:clrMapOvr>
+</p:sld>
+</file>
+
+<file path=ppt/slides/slide23.xml><?xml version="1.0" encoding="utf-8"?>
+<p:sld xmlns:a="http://schemas.openxmlformats.org/drawingml/2006/main" xmlns:r="http://schemas.openxmlformats.org/officeDocument/2006/relationships" xmlns:p="http://schemas.openxmlformats.org/presentationml/2006/main">
+  <p:cSld>
+    <p:spTree>
+      <p:nvGrpSpPr>
+        <p:cNvPr id="1" name=""/>
+        <p:cNvGrpSpPr/>
+        <p:nvPr/>
+      </p:nvGrpSpPr>
+      <p:grpSpPr>
+        <a:xfrm>
+          <a:off x="0" y="0"/>
+          <a:ext cx="0" cy="0"/>
+          <a:chOff x="0" y="0"/>
+          <a:chExt cx="0" cy="0"/>
+        </a:xfrm>
+      </p:grpSpPr>
+      <p:sp>
+        <p:nvSpPr>
+          <p:cNvPr id="4" name="標題 3">
+            <a:extLst>
+              <a:ext uri="{FF2B5EF4-FFF2-40B4-BE49-F238E27FC236}">
+                <a16:creationId xmlns:a16="http://schemas.microsoft.com/office/drawing/2014/main" id="{7DB22D88-1A93-4EC1-9D9A-996FB55606EA}"/>
+              </a:ext>
+            </a:extLst>
+          </p:cNvPr>
+          <p:cNvSpPr>
+            <a:spLocks noGrp="1"/>
+          </p:cNvSpPr>
+          <p:nvPr>
+            <p:ph type="title"/>
+          </p:nvPr>
+        </p:nvSpPr>
+        <p:spPr/>
+        <p:txBody>
+          <a:bodyPr/>
+          <a:lstStyle/>
+          <a:p>
+            <a:r>
+              <a:rPr lang="en-US" dirty="0"/>
+              <a:t>Async / Await</a:t>
+            </a:r>
+          </a:p>
+        </p:txBody>
+      </p:sp>
+      <p:sp>
+        <p:nvSpPr>
+          <p:cNvPr id="5" name="文字版面配置區 4">
+            <a:extLst>
+              <a:ext uri="{FF2B5EF4-FFF2-40B4-BE49-F238E27FC236}">
+                <a16:creationId xmlns:a16="http://schemas.microsoft.com/office/drawing/2014/main" id="{D5E6A227-FFA5-4259-A31A-D3FFAE2305C9}"/>
+              </a:ext>
+            </a:extLst>
+          </p:cNvPr>
+          <p:cNvSpPr>
+            <a:spLocks noGrp="1"/>
+          </p:cNvSpPr>
+          <p:nvPr>
+            <p:ph type="body" idx="1"/>
+          </p:nvPr>
+        </p:nvSpPr>
+        <p:spPr/>
+        <p:txBody>
+          <a:bodyPr/>
+          <a:lstStyle/>
+          <a:p>
+            <a:r>
+              <a:rPr lang="en-US" dirty="0"/>
+              <a:t>Wrap Async Call In Separate Process…</a:t>
+            </a:r>
+          </a:p>
+          <a:p>
+            <a:endParaRPr lang="en-US" dirty="0"/>
+          </a:p>
+        </p:txBody>
+      </p:sp>
+    </p:spTree>
+    <p:extLst>
+      <p:ext uri="{BB962C8B-B14F-4D97-AF65-F5344CB8AC3E}">
+        <p14:creationId xmlns:p14="http://schemas.microsoft.com/office/powerpoint/2010/main" val="3561391479"/>
+      </p:ext>
+    </p:extLst>
+  </p:cSld>
+  <p:clrMapOvr>
+    <a:masterClrMapping/>
+  </p:clrMapOvr>
+</p:sld>
+</file>
+
+<file path=ppt/slides/slide24.xml><?xml version="1.0" encoding="utf-8"?>
+<p:sld xmlns:a="http://schemas.openxmlformats.org/drawingml/2006/main" xmlns:r="http://schemas.openxmlformats.org/officeDocument/2006/relationships" xmlns:p="http://schemas.openxmlformats.org/presentationml/2006/main">
+  <p:cSld>
+    <p:spTree>
+      <p:nvGrpSpPr>
+        <p:cNvPr id="1" name=""/>
+        <p:cNvGrpSpPr/>
+        <p:nvPr/>
+      </p:nvGrpSpPr>
+      <p:grpSpPr>
+        <a:xfrm>
+          <a:off x="0" y="0"/>
+          <a:ext cx="0" cy="0"/>
+          <a:chOff x="0" y="0"/>
+          <a:chExt cx="0" cy="0"/>
+        </a:xfrm>
+      </p:grpSpPr>
+      <p:sp>
+        <p:nvSpPr>
+          <p:cNvPr id="4" name="標題 3">
+            <a:extLst>
+              <a:ext uri="{FF2B5EF4-FFF2-40B4-BE49-F238E27FC236}">
                 <a16:creationId xmlns:a16="http://schemas.microsoft.com/office/drawing/2014/main" id="{7DB22D88-1A93-4EC1-9D9A-996FB55606EA}"/>
               </a:ext>
             </a:extLst>
@@ -16794,7 +17227,145 @@
 </p:sld>
 </file>
 
-<file path=ppt/slides/slide22.xml><?xml version="1.0" encoding="utf-8"?>
+<file path=ppt/slides/slide25.xml><?xml version="1.0" encoding="utf-8"?>
+<p:sld xmlns:a="http://schemas.openxmlformats.org/drawingml/2006/main" xmlns:r="http://schemas.openxmlformats.org/officeDocument/2006/relationships" xmlns:p="http://schemas.openxmlformats.org/presentationml/2006/main">
+  <p:cSld>
+    <p:spTree>
+      <p:nvGrpSpPr>
+        <p:cNvPr id="1" name=""/>
+        <p:cNvGrpSpPr/>
+        <p:nvPr/>
+      </p:nvGrpSpPr>
+      <p:grpSpPr>
+        <a:xfrm>
+          <a:off x="0" y="0"/>
+          <a:ext cx="0" cy="0"/>
+          <a:chOff x="0" y="0"/>
+          <a:chExt cx="0" cy="0"/>
+        </a:xfrm>
+      </p:grpSpPr>
+      <p:sp>
+        <p:nvSpPr>
+          <p:cNvPr id="4" name="標題 3">
+            <a:extLst>
+              <a:ext uri="{FF2B5EF4-FFF2-40B4-BE49-F238E27FC236}">
+                <a16:creationId xmlns:a16="http://schemas.microsoft.com/office/drawing/2014/main" id="{7DB22D88-1A93-4EC1-9D9A-996FB55606EA}"/>
+              </a:ext>
+            </a:extLst>
+          </p:cNvPr>
+          <p:cNvSpPr>
+            <a:spLocks noGrp="1"/>
+          </p:cNvSpPr>
+          <p:nvPr>
+            <p:ph type="title"/>
+          </p:nvPr>
+        </p:nvSpPr>
+        <p:spPr/>
+        <p:txBody>
+          <a:bodyPr/>
+          <a:lstStyle/>
+          <a:p>
+            <a:r>
+              <a:rPr lang="en-US" dirty="0"/>
+              <a:t>Graceful Shutdown</a:t>
+            </a:r>
+          </a:p>
+        </p:txBody>
+      </p:sp>
+      <p:sp>
+        <p:nvSpPr>
+          <p:cNvPr id="5" name="文字版面配置區 4">
+            <a:extLst>
+              <a:ext uri="{FF2B5EF4-FFF2-40B4-BE49-F238E27FC236}">
+                <a16:creationId xmlns:a16="http://schemas.microsoft.com/office/drawing/2014/main" id="{D5E6A227-FFA5-4259-A31A-D3FFAE2305C9}"/>
+              </a:ext>
+            </a:extLst>
+          </p:cNvPr>
+          <p:cNvSpPr>
+            <a:spLocks noGrp="1"/>
+          </p:cNvSpPr>
+          <p:nvPr>
+            <p:ph type="body" idx="1"/>
+          </p:nvPr>
+        </p:nvSpPr>
+        <p:spPr/>
+        <p:txBody>
+          <a:bodyPr/>
+          <a:lstStyle/>
+          <a:p>
+            <a:r>
+              <a:rPr lang="en-US" dirty="0"/>
+              <a:t>When VM / Container Being Shutdown…</a:t>
+            </a:r>
+          </a:p>
+          <a:p>
+            <a:pPr marL="38100" indent="0">
+              <a:buNone/>
+            </a:pPr>
+            <a:r>
+              <a:rPr lang="en-US" dirty="0"/>
+              <a:t>{</a:t>
+            </a:r>
+          </a:p>
+          <a:p>
+            <a:pPr lvl="1"/>
+            <a:r>
+              <a:rPr lang="en-US" dirty="0"/>
+              <a:t>Receive OS shutdown signal</a:t>
+            </a:r>
+          </a:p>
+          <a:p>
+            <a:pPr lvl="1"/>
+            <a:r>
+              <a:rPr lang="en-US" dirty="0"/>
+              <a:t>Stop Receive Newer Message</a:t>
+            </a:r>
+          </a:p>
+          <a:p>
+            <a:pPr lvl="1"/>
+            <a:r>
+              <a:rPr lang="en-US" dirty="0"/>
+              <a:t>Wait Until All Messages Ack</a:t>
+            </a:r>
+          </a:p>
+          <a:p>
+            <a:pPr lvl="1"/>
+            <a:r>
+              <a:rPr lang="en-US" dirty="0"/>
+              <a:t>Exit Process Normally</a:t>
+            </a:r>
+          </a:p>
+          <a:p>
+            <a:pPr marL="38100" indent="0">
+              <a:buNone/>
+            </a:pPr>
+            <a:r>
+              <a:rPr lang="en-US" dirty="0"/>
+              <a:t>}</a:t>
+            </a:r>
+          </a:p>
+          <a:p>
+            <a:r>
+              <a:rPr lang="en-US" dirty="0"/>
+              <a:t>Successful Shutdown VM / Container</a:t>
+            </a:r>
+          </a:p>
+        </p:txBody>
+      </p:sp>
+    </p:spTree>
+    <p:extLst>
+      <p:ext uri="{BB962C8B-B14F-4D97-AF65-F5344CB8AC3E}">
+        <p14:creationId xmlns:p14="http://schemas.microsoft.com/office/powerpoint/2010/main" val="1886558902"/>
+      </p:ext>
+    </p:extLst>
+  </p:cSld>
+  <p:clrMapOvr>
+    <a:masterClrMapping/>
+  </p:clrMapOvr>
+</p:sld>
+</file>
+
+<file path=ppt/slides/slide26.xml><?xml version="1.0" encoding="utf-8"?>
 <p:sld xmlns:a="http://schemas.openxmlformats.org/drawingml/2006/main" xmlns:r="http://schemas.openxmlformats.org/officeDocument/2006/relationships" xmlns:p="http://schemas.openxmlformats.org/presentationml/2006/main">
   <p:cSld>
     <p:spTree>
@@ -16921,7 +17492,7 @@
 </p:sld>
 </file>
 
-<file path=ppt/slides/slide23.xml><?xml version="1.0" encoding="utf-8"?>
+<file path=ppt/slides/slide27.xml><?xml version="1.0" encoding="utf-8"?>
 <p:sld xmlns:a="http://schemas.openxmlformats.org/drawingml/2006/main" xmlns:r="http://schemas.openxmlformats.org/officeDocument/2006/relationships" xmlns:p="http://schemas.openxmlformats.org/presentationml/2006/main">
   <p:cSld>
     <p:spTree>
@@ -17048,7 +17619,7 @@
 </p:sld>
 </file>
 
-<file path=ppt/slides/slide24.xml><?xml version="1.0" encoding="utf-8"?>
+<file path=ppt/slides/slide28.xml><?xml version="1.0" encoding="utf-8"?>
 <p:sld xmlns:a="http://schemas.openxmlformats.org/drawingml/2006/main" xmlns:r="http://schemas.openxmlformats.org/officeDocument/2006/relationships" xmlns:p="http://schemas.openxmlformats.org/presentationml/2006/main">
   <p:cSld>
     <p:spTree>
@@ -17065,6 +17636,336 @@
           <a:chExt cx="0" cy="0"/>
         </a:xfrm>
       </p:grpSpPr>
+      <p:pic>
+        <p:nvPicPr>
+          <p:cNvPr id="6" name="圖片 5">
+            <a:extLst>
+              <a:ext uri="{FF2B5EF4-FFF2-40B4-BE49-F238E27FC236}">
+                <a16:creationId xmlns:a16="http://schemas.microsoft.com/office/drawing/2014/main" id="{C27DB79F-0F67-4E8C-9280-D60103E5DB79}"/>
+              </a:ext>
+            </a:extLst>
+          </p:cNvPr>
+          <p:cNvPicPr>
+            <a:picLocks noChangeAspect="1"/>
+          </p:cNvPicPr>
+          <p:nvPr/>
+        </p:nvPicPr>
+        <p:blipFill>
+          <a:blip r:embed="rId2"/>
+          <a:stretch>
+            <a:fillRect/>
+          </a:stretch>
+        </p:blipFill>
+        <p:spPr>
+          <a:xfrm>
+            <a:off x="371146" y="0"/>
+            <a:ext cx="8401707" cy="5143500"/>
+          </a:xfrm>
+          <a:prstGeom prst="rect">
+            <a:avLst/>
+          </a:prstGeom>
+        </p:spPr>
+      </p:pic>
+      <p:sp>
+        <p:nvSpPr>
+          <p:cNvPr id="7" name="文字方塊 6">
+            <a:extLst>
+              <a:ext uri="{FF2B5EF4-FFF2-40B4-BE49-F238E27FC236}">
+                <a16:creationId xmlns:a16="http://schemas.microsoft.com/office/drawing/2014/main" id="{5CBEB6EA-7EE6-4E78-8EE0-E9CFF4AD86C0}"/>
+              </a:ext>
+            </a:extLst>
+          </p:cNvPr>
+          <p:cNvSpPr txBox="1"/>
+          <p:nvPr/>
+        </p:nvSpPr>
+        <p:spPr>
+          <a:xfrm>
+            <a:off x="7012992" y="1433596"/>
+            <a:ext cx="970137" cy="307777"/>
+          </a:xfrm>
+          <a:prstGeom prst="rect">
+            <a:avLst/>
+          </a:prstGeom>
+          <a:noFill/>
+        </p:spPr>
+        <p:txBody>
+          <a:bodyPr wrap="none" rtlCol="0">
+            <a:spAutoFit/>
+          </a:bodyPr>
+          <a:lstStyle/>
+          <a:p>
+            <a:r>
+              <a:rPr lang="en-US" altLang="zh-TW" dirty="0"/>
+              <a:t>first </a:t>
+            </a:r>
+            <a:r>
+              <a:rPr lang="en-US" altLang="zh-TW" b="1" dirty="0">
+                <a:solidFill>
+                  <a:srgbClr val="00B0F0"/>
+                </a:solidFill>
+              </a:rPr>
+              <a:t>await</a:t>
+            </a:r>
+            <a:endParaRPr lang="zh-TW" altLang="en-US" b="1" dirty="0">
+              <a:solidFill>
+                <a:srgbClr val="00B0F0"/>
+              </a:solidFill>
+            </a:endParaRPr>
+          </a:p>
+        </p:txBody>
+      </p:sp>
+      <p:sp>
+        <p:nvSpPr>
+          <p:cNvPr id="8" name="文字方塊 7">
+            <a:extLst>
+              <a:ext uri="{FF2B5EF4-FFF2-40B4-BE49-F238E27FC236}">
+                <a16:creationId xmlns:a16="http://schemas.microsoft.com/office/drawing/2014/main" id="{843C0018-94BB-4B07-9560-F3A9FFB1968E}"/>
+              </a:ext>
+            </a:extLst>
+          </p:cNvPr>
+          <p:cNvSpPr txBox="1"/>
+          <p:nvPr/>
+        </p:nvSpPr>
+        <p:spPr>
+          <a:xfrm>
+            <a:off x="7207524" y="2708455"/>
+            <a:ext cx="1837362" cy="307777"/>
+          </a:xfrm>
+          <a:prstGeom prst="rect">
+            <a:avLst/>
+          </a:prstGeom>
+          <a:noFill/>
+        </p:spPr>
+        <p:txBody>
+          <a:bodyPr wrap="none" rtlCol="0">
+            <a:spAutoFit/>
+          </a:bodyPr>
+          <a:lstStyle/>
+          <a:p>
+            <a:r>
+              <a:rPr lang="en-US" altLang="zh-TW" dirty="0"/>
+              <a:t>wait shutdown signal</a:t>
+            </a:r>
+            <a:endParaRPr lang="zh-TW" altLang="en-US" dirty="0"/>
+          </a:p>
+        </p:txBody>
+      </p:sp>
+      <p:sp>
+        <p:nvSpPr>
+          <p:cNvPr id="9" name="右大括弧 8">
+            <a:extLst>
+              <a:ext uri="{FF2B5EF4-FFF2-40B4-BE49-F238E27FC236}">
+                <a16:creationId xmlns:a16="http://schemas.microsoft.com/office/drawing/2014/main" id="{C264A318-E073-464B-B9FC-A3F0C7A70918}"/>
+              </a:ext>
+            </a:extLst>
+          </p:cNvPr>
+          <p:cNvSpPr/>
+          <p:nvPr/>
+        </p:nvSpPr>
+        <p:spPr>
+          <a:xfrm>
+            <a:off x="7074976" y="1800586"/>
+            <a:ext cx="162732" cy="2197977"/>
+          </a:xfrm>
+          <a:prstGeom prst="rightBrace">
+            <a:avLst/>
+          </a:prstGeom>
+        </p:spPr>
+        <p:style>
+          <a:lnRef idx="1">
+            <a:schemeClr val="accent1"/>
+          </a:lnRef>
+          <a:fillRef idx="0">
+            <a:schemeClr val="accent1"/>
+          </a:fillRef>
+          <a:effectRef idx="0">
+            <a:schemeClr val="accent1"/>
+          </a:effectRef>
+          <a:fontRef idx="minor">
+            <a:schemeClr val="tx1"/>
+          </a:fontRef>
+        </p:style>
+        <p:txBody>
+          <a:bodyPr rtlCol="0" anchor="ctr"/>
+          <a:lstStyle/>
+          <a:p>
+            <a:pPr algn="ctr"/>
+            <a:endParaRPr lang="zh-TW" altLang="en-US"/>
+          </a:p>
+        </p:txBody>
+      </p:sp>
+      <p:sp>
+        <p:nvSpPr>
+          <p:cNvPr id="10" name="右大括弧 9">
+            <a:extLst>
+              <a:ext uri="{FF2B5EF4-FFF2-40B4-BE49-F238E27FC236}">
+                <a16:creationId xmlns:a16="http://schemas.microsoft.com/office/drawing/2014/main" id="{B1940DC2-13DD-409C-9264-C884C0813154}"/>
+              </a:ext>
+            </a:extLst>
+          </p:cNvPr>
+          <p:cNvSpPr/>
+          <p:nvPr/>
+        </p:nvSpPr>
+        <p:spPr>
+          <a:xfrm>
+            <a:off x="7074976" y="4068305"/>
+            <a:ext cx="162732" cy="426204"/>
+          </a:xfrm>
+          <a:prstGeom prst="rightBrace">
+            <a:avLst/>
+          </a:prstGeom>
+        </p:spPr>
+        <p:style>
+          <a:lnRef idx="1">
+            <a:schemeClr val="accent1"/>
+          </a:lnRef>
+          <a:fillRef idx="0">
+            <a:schemeClr val="accent1"/>
+          </a:fillRef>
+          <a:effectRef idx="0">
+            <a:schemeClr val="accent1"/>
+          </a:effectRef>
+          <a:fontRef idx="minor">
+            <a:schemeClr val="tx1"/>
+          </a:fontRef>
+        </p:style>
+        <p:txBody>
+          <a:bodyPr rtlCol="0" anchor="ctr"/>
+          <a:lstStyle/>
+          <a:p>
+            <a:pPr algn="ctr"/>
+            <a:endParaRPr lang="zh-TW" altLang="en-US"/>
+          </a:p>
+        </p:txBody>
+      </p:sp>
+      <p:sp>
+        <p:nvSpPr>
+          <p:cNvPr id="11" name="文字方塊 10">
+            <a:extLst>
+              <a:ext uri="{FF2B5EF4-FFF2-40B4-BE49-F238E27FC236}">
+                <a16:creationId xmlns:a16="http://schemas.microsoft.com/office/drawing/2014/main" id="{6420A28A-AC27-43BC-BC5C-B92A8E3E1326}"/>
+              </a:ext>
+            </a:extLst>
+          </p:cNvPr>
+          <p:cNvSpPr txBox="1"/>
+          <p:nvPr/>
+        </p:nvSpPr>
+        <p:spPr>
+          <a:xfrm>
+            <a:off x="7207524" y="4127518"/>
+            <a:ext cx="1885453" cy="307777"/>
+          </a:xfrm>
+          <a:prstGeom prst="rect">
+            <a:avLst/>
+          </a:prstGeom>
+          <a:noFill/>
+        </p:spPr>
+        <p:txBody>
+          <a:bodyPr wrap="none" rtlCol="0">
+            <a:spAutoFit/>
+          </a:bodyPr>
+          <a:lstStyle/>
+          <a:p>
+            <a:r>
+              <a:rPr lang="en-US" altLang="zh-TW" dirty="0"/>
+              <a:t>do graceful shutdown</a:t>
+            </a:r>
+            <a:endParaRPr lang="zh-TW" altLang="en-US" dirty="0"/>
+          </a:p>
+        </p:txBody>
+      </p:sp>
+      <p:sp>
+        <p:nvSpPr>
+          <p:cNvPr id="12" name="矩形: 圓角 11">
+            <a:extLst>
+              <a:ext uri="{FF2B5EF4-FFF2-40B4-BE49-F238E27FC236}">
+                <a16:creationId xmlns:a16="http://schemas.microsoft.com/office/drawing/2014/main" id="{9CB87AAF-CB18-4649-B598-D369BF2DBF33}"/>
+              </a:ext>
+            </a:extLst>
+          </p:cNvPr>
+          <p:cNvSpPr/>
+          <p:nvPr/>
+        </p:nvSpPr>
+        <p:spPr>
+          <a:xfrm flipV="1">
+            <a:off x="6470542" y="271222"/>
+            <a:ext cx="1061634" cy="317714"/>
+          </a:xfrm>
+          <a:prstGeom prst="roundRect">
+            <a:avLst/>
+          </a:prstGeom>
+          <a:noFill/>
+          <a:ln w="38100"/>
+        </p:spPr>
+        <p:style>
+          <a:lnRef idx="2">
+            <a:schemeClr val="accent1"/>
+          </a:lnRef>
+          <a:fillRef idx="1">
+            <a:schemeClr val="lt1"/>
+          </a:fillRef>
+          <a:effectRef idx="0">
+            <a:schemeClr val="accent1"/>
+          </a:effectRef>
+          <a:fontRef idx="minor">
+            <a:schemeClr val="dk1"/>
+          </a:fontRef>
+        </p:style>
+        <p:txBody>
+          <a:bodyPr rtlCol="0" anchor="ctr"/>
+          <a:lstStyle/>
+          <a:p>
+            <a:pPr algn="ctr"/>
+            <a:endParaRPr lang="zh-TW" altLang="en-US"/>
+          </a:p>
+        </p:txBody>
+      </p:sp>
+      <p:sp>
+        <p:nvSpPr>
+          <p:cNvPr id="13" name="矩形: 圓角 12">
+            <a:extLst>
+              <a:ext uri="{FF2B5EF4-FFF2-40B4-BE49-F238E27FC236}">
+                <a16:creationId xmlns:a16="http://schemas.microsoft.com/office/drawing/2014/main" id="{2BB176AC-B415-4000-B8DC-45EE425E93DB}"/>
+              </a:ext>
+            </a:extLst>
+          </p:cNvPr>
+          <p:cNvSpPr/>
+          <p:nvPr/>
+        </p:nvSpPr>
+        <p:spPr>
+          <a:xfrm flipV="1">
+            <a:off x="550190" y="271222"/>
+            <a:ext cx="829159" cy="317714"/>
+          </a:xfrm>
+          <a:prstGeom prst="roundRect">
+            <a:avLst/>
+          </a:prstGeom>
+          <a:noFill/>
+          <a:ln w="38100"/>
+        </p:spPr>
+        <p:style>
+          <a:lnRef idx="2">
+            <a:schemeClr val="accent1"/>
+          </a:lnRef>
+          <a:fillRef idx="1">
+            <a:schemeClr val="lt1"/>
+          </a:fillRef>
+          <a:effectRef idx="0">
+            <a:schemeClr val="accent1"/>
+          </a:effectRef>
+          <a:fontRef idx="minor">
+            <a:schemeClr val="dk1"/>
+          </a:fontRef>
+        </p:style>
+        <p:txBody>
+          <a:bodyPr rtlCol="0" anchor="ctr"/>
+          <a:lstStyle/>
+          <a:p>
+            <a:pPr algn="ctr"/>
+            <a:endParaRPr lang="zh-TW" altLang="en-US"/>
+          </a:p>
+        </p:txBody>
+      </p:sp>
     </p:spTree>
     <p:extLst>
       <p:ext uri="{BB962C8B-B14F-4D97-AF65-F5344CB8AC3E}">
@@ -17078,7 +17979,7 @@
 </p:sld>
 </file>
 
-<file path=ppt/slides/slide25.xml><?xml version="1.0" encoding="utf-8"?>
+<file path=ppt/slides/slide29.xml><?xml version="1.0" encoding="utf-8"?>
 <p:sld xmlns:a="http://schemas.openxmlformats.org/drawingml/2006/main" xmlns:r="http://schemas.openxmlformats.org/officeDocument/2006/relationships" xmlns:p="http://schemas.openxmlformats.org/presentationml/2006/main">
   <p:cSld>
     <p:spTree>
@@ -17097,58 +17998,340 @@
       </p:grpSpPr>
       <p:sp>
         <p:nvSpPr>
-          <p:cNvPr id="4" name="標題 3">
-            <a:extLst>
-              <a:ext uri="{FF2B5EF4-FFF2-40B4-BE49-F238E27FC236}">
-                <a16:creationId xmlns:a16="http://schemas.microsoft.com/office/drawing/2014/main" id="{7DB22D88-1A93-4EC1-9D9A-996FB55606EA}"/>
-              </a:ext>
-            </a:extLst>
-          </p:cNvPr>
-          <p:cNvSpPr>
-            <a:spLocks noGrp="1"/>
+          <p:cNvPr id="4" name="標題 2">
+            <a:extLst>
+              <a:ext uri="{FF2B5EF4-FFF2-40B4-BE49-F238E27FC236}">
+                <a16:creationId xmlns:a16="http://schemas.microsoft.com/office/drawing/2014/main" id="{AE396F7F-C7D6-469A-8DA9-3D8F5EEADABE}"/>
+              </a:ext>
+            </a:extLst>
+          </p:cNvPr>
+          <p:cNvSpPr txBox="1">
+            <a:spLocks/>
           </p:cNvSpPr>
-          <p:nvPr>
-            <p:ph type="title"/>
-          </p:nvPr>
-        </p:nvSpPr>
-        <p:spPr/>
+          <p:nvPr/>
+        </p:nvSpPr>
+        <p:spPr>
+          <a:xfrm>
+            <a:off x="565670" y="-655884"/>
+            <a:ext cx="9214645" cy="749054"/>
+          </a:xfrm>
+          <a:prstGeom prst="rect">
+            <a:avLst/>
+          </a:prstGeom>
+        </p:spPr>
         <p:txBody>
           <a:bodyPr/>
+          <a:lstStyle>
+            <a:defPPr marR="0" lvl="0" algn="l" rtl="0">
+              <a:lnSpc>
+                <a:spcPct val="100000"/>
+              </a:lnSpc>
+              <a:spcBef>
+                <a:spcPts val="0"/>
+              </a:spcBef>
+              <a:spcAft>
+                <a:spcPts val="0"/>
+              </a:spcAft>
+            </a:defPPr>
+            <a:lvl1pPr marR="0" lvl="0" algn="l" rtl="0">
+              <a:lnSpc>
+                <a:spcPct val="100000"/>
+              </a:lnSpc>
+              <a:spcBef>
+                <a:spcPts val="0"/>
+              </a:spcBef>
+              <a:spcAft>
+                <a:spcPts val="0"/>
+              </a:spcAft>
+              <a:buClr>
+                <a:srgbClr val="000000"/>
+              </a:buClr>
+              <a:buFont typeface="Arial"/>
+              <a:defRPr sz="1400" b="0" i="0" u="none" strike="noStrike" cap="none">
+                <a:solidFill>
+                  <a:srgbClr val="000000"/>
+                </a:solidFill>
+                <a:latin typeface="Arial"/>
+                <a:ea typeface="Arial"/>
+                <a:cs typeface="Arial"/>
+                <a:sym typeface="Arial"/>
+              </a:defRPr>
+            </a:lvl1pPr>
+            <a:lvl2pPr marR="0" lvl="1" algn="l" rtl="0">
+              <a:lnSpc>
+                <a:spcPct val="100000"/>
+              </a:lnSpc>
+              <a:spcBef>
+                <a:spcPts val="0"/>
+              </a:spcBef>
+              <a:spcAft>
+                <a:spcPts val="0"/>
+              </a:spcAft>
+              <a:buClr>
+                <a:srgbClr val="000000"/>
+              </a:buClr>
+              <a:buFont typeface="Arial"/>
+              <a:defRPr sz="1400" b="0" i="0" u="none" strike="noStrike" cap="none">
+                <a:solidFill>
+                  <a:srgbClr val="000000"/>
+                </a:solidFill>
+                <a:latin typeface="Arial"/>
+                <a:ea typeface="Arial"/>
+                <a:cs typeface="Arial"/>
+                <a:sym typeface="Arial"/>
+              </a:defRPr>
+            </a:lvl2pPr>
+            <a:lvl3pPr marR="0" lvl="2" algn="l" rtl="0">
+              <a:lnSpc>
+                <a:spcPct val="100000"/>
+              </a:lnSpc>
+              <a:spcBef>
+                <a:spcPts val="0"/>
+              </a:spcBef>
+              <a:spcAft>
+                <a:spcPts val="0"/>
+              </a:spcAft>
+              <a:buClr>
+                <a:srgbClr val="000000"/>
+              </a:buClr>
+              <a:buFont typeface="Arial"/>
+              <a:defRPr sz="1400" b="0" i="0" u="none" strike="noStrike" cap="none">
+                <a:solidFill>
+                  <a:srgbClr val="000000"/>
+                </a:solidFill>
+                <a:latin typeface="Arial"/>
+                <a:ea typeface="Arial"/>
+                <a:cs typeface="Arial"/>
+                <a:sym typeface="Arial"/>
+              </a:defRPr>
+            </a:lvl3pPr>
+            <a:lvl4pPr marR="0" lvl="3" algn="l" rtl="0">
+              <a:lnSpc>
+                <a:spcPct val="100000"/>
+              </a:lnSpc>
+              <a:spcBef>
+                <a:spcPts val="0"/>
+              </a:spcBef>
+              <a:spcAft>
+                <a:spcPts val="0"/>
+              </a:spcAft>
+              <a:buClr>
+                <a:srgbClr val="000000"/>
+              </a:buClr>
+              <a:buFont typeface="Arial"/>
+              <a:defRPr sz="1400" b="0" i="0" u="none" strike="noStrike" cap="none">
+                <a:solidFill>
+                  <a:srgbClr val="000000"/>
+                </a:solidFill>
+                <a:latin typeface="Arial"/>
+                <a:ea typeface="Arial"/>
+                <a:cs typeface="Arial"/>
+                <a:sym typeface="Arial"/>
+              </a:defRPr>
+            </a:lvl4pPr>
+            <a:lvl5pPr marR="0" lvl="4" algn="l" rtl="0">
+              <a:lnSpc>
+                <a:spcPct val="100000"/>
+              </a:lnSpc>
+              <a:spcBef>
+                <a:spcPts val="0"/>
+              </a:spcBef>
+              <a:spcAft>
+                <a:spcPts val="0"/>
+              </a:spcAft>
+              <a:buClr>
+                <a:srgbClr val="000000"/>
+              </a:buClr>
+              <a:buFont typeface="Arial"/>
+              <a:defRPr sz="1400" b="0" i="0" u="none" strike="noStrike" cap="none">
+                <a:solidFill>
+                  <a:srgbClr val="000000"/>
+                </a:solidFill>
+                <a:latin typeface="Arial"/>
+                <a:ea typeface="Arial"/>
+                <a:cs typeface="Arial"/>
+                <a:sym typeface="Arial"/>
+              </a:defRPr>
+            </a:lvl5pPr>
+            <a:lvl6pPr marR="0" lvl="5" algn="l" rtl="0">
+              <a:lnSpc>
+                <a:spcPct val="100000"/>
+              </a:lnSpc>
+              <a:spcBef>
+                <a:spcPts val="0"/>
+              </a:spcBef>
+              <a:spcAft>
+                <a:spcPts val="0"/>
+              </a:spcAft>
+              <a:buClr>
+                <a:srgbClr val="000000"/>
+              </a:buClr>
+              <a:buFont typeface="Arial"/>
+              <a:defRPr sz="1400" b="0" i="0" u="none" strike="noStrike" cap="none">
+                <a:solidFill>
+                  <a:srgbClr val="000000"/>
+                </a:solidFill>
+                <a:latin typeface="Arial"/>
+                <a:ea typeface="Arial"/>
+                <a:cs typeface="Arial"/>
+                <a:sym typeface="Arial"/>
+              </a:defRPr>
+            </a:lvl6pPr>
+            <a:lvl7pPr marR="0" lvl="6" algn="l" rtl="0">
+              <a:lnSpc>
+                <a:spcPct val="100000"/>
+              </a:lnSpc>
+              <a:spcBef>
+                <a:spcPts val="0"/>
+              </a:spcBef>
+              <a:spcAft>
+                <a:spcPts val="0"/>
+              </a:spcAft>
+              <a:buClr>
+                <a:srgbClr val="000000"/>
+              </a:buClr>
+              <a:buFont typeface="Arial"/>
+              <a:defRPr sz="1400" b="0" i="0" u="none" strike="noStrike" cap="none">
+                <a:solidFill>
+                  <a:srgbClr val="000000"/>
+                </a:solidFill>
+                <a:latin typeface="Arial"/>
+                <a:ea typeface="Arial"/>
+                <a:cs typeface="Arial"/>
+                <a:sym typeface="Arial"/>
+              </a:defRPr>
+            </a:lvl7pPr>
+            <a:lvl8pPr marR="0" lvl="7" algn="l" rtl="0">
+              <a:lnSpc>
+                <a:spcPct val="100000"/>
+              </a:lnSpc>
+              <a:spcBef>
+                <a:spcPts val="0"/>
+              </a:spcBef>
+              <a:spcAft>
+                <a:spcPts val="0"/>
+              </a:spcAft>
+              <a:buClr>
+                <a:srgbClr val="000000"/>
+              </a:buClr>
+              <a:buFont typeface="Arial"/>
+              <a:defRPr sz="1400" b="0" i="0" u="none" strike="noStrike" cap="none">
+                <a:solidFill>
+                  <a:srgbClr val="000000"/>
+                </a:solidFill>
+                <a:latin typeface="Arial"/>
+                <a:ea typeface="Arial"/>
+                <a:cs typeface="Arial"/>
+                <a:sym typeface="Arial"/>
+              </a:defRPr>
+            </a:lvl8pPr>
+            <a:lvl9pPr marR="0" lvl="8" algn="l" rtl="0">
+              <a:lnSpc>
+                <a:spcPct val="100000"/>
+              </a:lnSpc>
+              <a:spcBef>
+                <a:spcPts val="0"/>
+              </a:spcBef>
+              <a:spcAft>
+                <a:spcPts val="0"/>
+              </a:spcAft>
+              <a:buClr>
+                <a:srgbClr val="000000"/>
+              </a:buClr>
+              <a:buFont typeface="Arial"/>
+              <a:defRPr sz="1400" b="0" i="0" u="none" strike="noStrike" cap="none">
+                <a:solidFill>
+                  <a:srgbClr val="000000"/>
+                </a:solidFill>
+                <a:latin typeface="Arial"/>
+                <a:ea typeface="Arial"/>
+                <a:cs typeface="Arial"/>
+                <a:sym typeface="Arial"/>
+              </a:defRPr>
+            </a:lvl9pPr>
+          </a:lstStyle>
+          <a:p>
+            <a:r>
+              <a:rPr lang="en-US" altLang="zh-TW"/>
+              <a:t>What Is “AutoResetEvent” ?</a:t>
+            </a:r>
+            <a:endParaRPr lang="zh-TW" altLang="en-US" dirty="0"/>
+          </a:p>
+        </p:txBody>
+      </p:sp>
+      <p:sp>
+        <p:nvSpPr>
+          <p:cNvPr id="5" name="矩形 4">
+            <a:extLst>
+              <a:ext uri="{FF2B5EF4-FFF2-40B4-BE49-F238E27FC236}">
+                <a16:creationId xmlns:a16="http://schemas.microsoft.com/office/drawing/2014/main" id="{236FE97D-D579-4C64-A4EB-B76F5A2D5964}"/>
+              </a:ext>
+            </a:extLst>
+          </p:cNvPr>
+          <p:cNvSpPr/>
+          <p:nvPr/>
+        </p:nvSpPr>
+        <p:spPr>
+          <a:xfrm>
+            <a:off x="171547" y="4095896"/>
+            <a:ext cx="11436684" cy="523220"/>
+          </a:xfrm>
+          <a:prstGeom prst="rect">
+            <a:avLst/>
+          </a:prstGeom>
+        </p:spPr>
+        <p:txBody>
+          <a:bodyPr wrap="square">
+            <a:spAutoFit/>
+          </a:bodyPr>
           <a:lstStyle/>
           <a:p>
-            <a:endParaRPr lang="en-US"/>
-          </a:p>
-        </p:txBody>
-      </p:sp>
-      <p:sp>
-        <p:nvSpPr>
-          <p:cNvPr id="5" name="文字版面配置區 4">
-            <a:extLst>
-              <a:ext uri="{FF2B5EF4-FFF2-40B4-BE49-F238E27FC236}">
-                <a16:creationId xmlns:a16="http://schemas.microsoft.com/office/drawing/2014/main" id="{D5E6A227-FFA5-4259-A31A-D3FFAE2305C9}"/>
-              </a:ext>
-            </a:extLst>
-          </p:cNvPr>
-          <p:cNvSpPr>
-            <a:spLocks noGrp="1"/>
-          </p:cNvSpPr>
-          <p:nvPr>
-            <p:ph type="body" idx="1"/>
-          </p:nvPr>
-        </p:nvSpPr>
-        <p:spPr/>
-        <p:txBody>
-          <a:bodyPr/>
-          <a:lstStyle/>
-          <a:p>
-            <a:endParaRPr lang="en-US"/>
-          </a:p>
-        </p:txBody>
-      </p:sp>
+            <a:r>
+              <a:rPr lang="zh-TW" altLang="en-US" dirty="0">
+                <a:hlinkClick r:id="rId2"/>
+              </a:rPr>
+              <a:t>https://columns.chicken-house.net/2007/12/17/threadpool-%E5%AF%A6%E4%BD%9C-3-autoresetevent-manualresetevent/</a:t>
+            </a:r>
+            <a:endParaRPr lang="en-US" altLang="zh-TW" dirty="0"/>
+          </a:p>
+          <a:p>
+            <a:endParaRPr lang="zh-TW" altLang="en-US" dirty="0"/>
+          </a:p>
+        </p:txBody>
+      </p:sp>
+      <p:pic>
+        <p:nvPicPr>
+          <p:cNvPr id="6" name="圖片 5">
+            <a:extLst>
+              <a:ext uri="{FF2B5EF4-FFF2-40B4-BE49-F238E27FC236}">
+                <a16:creationId xmlns:a16="http://schemas.microsoft.com/office/drawing/2014/main" id="{A0AFDBB5-8974-4582-9F05-9D5F442F802B}"/>
+              </a:ext>
+            </a:extLst>
+          </p:cNvPr>
+          <p:cNvPicPr>
+            <a:picLocks noChangeAspect="1"/>
+          </p:cNvPicPr>
+          <p:nvPr/>
+        </p:nvPicPr>
+        <p:blipFill rotWithShape="1">
+          <a:blip r:embed="rId3"/>
+          <a:srcRect t="-159" b="32381"/>
+          <a:stretch/>
+        </p:blipFill>
+        <p:spPr>
+          <a:xfrm>
+            <a:off x="171547" y="159505"/>
+            <a:ext cx="8800906" cy="3870056"/>
+          </a:xfrm>
+          <a:prstGeom prst="rect">
+            <a:avLst/>
+          </a:prstGeom>
+        </p:spPr>
+      </p:pic>
     </p:spTree>
     <p:extLst>
       <p:ext uri="{BB962C8B-B14F-4D97-AF65-F5344CB8AC3E}">
-        <p14:creationId xmlns:p14="http://schemas.microsoft.com/office/powerpoint/2010/main" val="1886558902"/>
+        <p14:creationId xmlns:p14="http://schemas.microsoft.com/office/powerpoint/2010/main" val="1164270202"/>
       </p:ext>
     </p:extLst>
   </p:cSld>
@@ -17158,7 +18341,7 @@
 </p:sld>
 </file>
 
-<file path=ppt/slides/slide26.xml><?xml version="1.0" encoding="utf-8"?>
+<file path=ppt/slides/slide3.xml><?xml version="1.0" encoding="utf-8"?>
 <p:sld xmlns:a="http://schemas.openxmlformats.org/drawingml/2006/main" xmlns:r="http://schemas.openxmlformats.org/officeDocument/2006/relationships" xmlns:p="http://schemas.openxmlformats.org/presentationml/2006/main">
   <p:cSld>
     <p:spTree>
@@ -17180,7 +18363,7 @@
           <p:cNvPr id="4" name="標題 3">
             <a:extLst>
               <a:ext uri="{FF2B5EF4-FFF2-40B4-BE49-F238E27FC236}">
-                <a16:creationId xmlns:a16="http://schemas.microsoft.com/office/drawing/2014/main" id="{7DB22D88-1A93-4EC1-9D9A-996FB55606EA}"/>
+                <a16:creationId xmlns:a16="http://schemas.microsoft.com/office/drawing/2014/main" id="{35CCDDFD-F728-4A0B-89D6-D80A3CFAE7E5}"/>
               </a:ext>
             </a:extLst>
           </p:cNvPr>
@@ -17196,39 +18379,93 @@
           <a:bodyPr/>
           <a:lstStyle/>
           <a:p>
-            <a:endParaRPr lang="en-US"/>
-          </a:p>
-        </p:txBody>
-      </p:sp>
-      <p:sp>
-        <p:nvSpPr>
-          <p:cNvPr id="5" name="文字版面配置區 4">
-            <a:extLst>
-              <a:ext uri="{FF2B5EF4-FFF2-40B4-BE49-F238E27FC236}">
-                <a16:creationId xmlns:a16="http://schemas.microsoft.com/office/drawing/2014/main" id="{D5E6A227-FFA5-4259-A31A-D3FFAE2305C9}"/>
-              </a:ext>
-            </a:extLst>
-          </p:cNvPr>
-          <p:cNvSpPr>
-            <a:spLocks noGrp="1"/>
-          </p:cNvSpPr>
-          <p:nvPr>
-            <p:ph type="body" idx="1"/>
-          </p:nvPr>
-        </p:nvSpPr>
-        <p:spPr/>
-        <p:txBody>
-          <a:bodyPr/>
-          <a:lstStyle/>
-          <a:p>
-            <a:endParaRPr lang="en-US"/>
-          </a:p>
-        </p:txBody>
-      </p:sp>
+            <a:r>
+              <a:rPr lang="en-US" dirty="0"/>
+              <a:t>.NET Microservices</a:t>
+            </a:r>
+          </a:p>
+        </p:txBody>
+      </p:sp>
+      <p:pic>
+        <p:nvPicPr>
+          <p:cNvPr id="3074" name="Picture 2" descr="æ¸ç±å°é¢">
+            <a:extLst>
+              <a:ext uri="{FF2B5EF4-FFF2-40B4-BE49-F238E27FC236}">
+                <a16:creationId xmlns:a16="http://schemas.microsoft.com/office/drawing/2014/main" id="{ED20BB43-9698-4A94-8AE6-EE7250533D14}"/>
+              </a:ext>
+            </a:extLst>
+          </p:cNvPr>
+          <p:cNvPicPr>
+            <a:picLocks noChangeAspect="1" noChangeArrowheads="1"/>
+          </p:cNvPicPr>
+          <p:nvPr/>
+        </p:nvPicPr>
+        <p:blipFill>
+          <a:blip r:embed="rId2">
+            <a:extLst>
+              <a:ext uri="{28A0092B-C50C-407E-A947-70E740481C1C}">
+                <a14:useLocalDpi xmlns:a14="http://schemas.microsoft.com/office/drawing/2010/main" val="0"/>
+              </a:ext>
+            </a:extLst>
+          </a:blip>
+          <a:srcRect/>
+          <a:stretch>
+            <a:fillRect/>
+          </a:stretch>
+        </p:blipFill>
+        <p:spPr bwMode="auto">
+          <a:xfrm>
+            <a:off x="799980" y="1350816"/>
+            <a:ext cx="2647950" cy="3429000"/>
+          </a:xfrm>
+          <a:prstGeom prst="rect">
+            <a:avLst/>
+          </a:prstGeom>
+          <a:noFill/>
+          <a:extLst>
+            <a:ext uri="{909E8E84-426E-40DD-AFC4-6F175D3DCCD1}">
+              <a14:hiddenFill xmlns:a14="http://schemas.microsoft.com/office/drawing/2010/main">
+                <a:solidFill>
+                  <a:srgbClr val="FFFFFF"/>
+                </a:solidFill>
+              </a14:hiddenFill>
+            </a:ext>
+          </a:extLst>
+        </p:spPr>
+      </p:pic>
+      <p:pic>
+        <p:nvPicPr>
+          <p:cNvPr id="6" name="圖片 5">
+            <a:extLst>
+              <a:ext uri="{FF2B5EF4-FFF2-40B4-BE49-F238E27FC236}">
+                <a16:creationId xmlns:a16="http://schemas.microsoft.com/office/drawing/2014/main" id="{5E342272-D16A-4FD3-A99A-59F25B32D304}"/>
+              </a:ext>
+            </a:extLst>
+          </p:cNvPr>
+          <p:cNvPicPr>
+            <a:picLocks noChangeAspect="1"/>
+          </p:cNvPicPr>
+          <p:nvPr/>
+        </p:nvPicPr>
+        <p:blipFill rotWithShape="1">
+          <a:blip r:embed="rId3"/>
+          <a:srcRect b="29142"/>
+          <a:stretch/>
+        </p:blipFill>
+        <p:spPr>
+          <a:xfrm>
+            <a:off x="4347622" y="1243027"/>
+            <a:ext cx="3082247" cy="3644579"/>
+          </a:xfrm>
+          <a:prstGeom prst="rect">
+            <a:avLst/>
+          </a:prstGeom>
+        </p:spPr>
+      </p:pic>
     </p:spTree>
     <p:extLst>
       <p:ext uri="{BB962C8B-B14F-4D97-AF65-F5344CB8AC3E}">
-        <p14:creationId xmlns:p14="http://schemas.microsoft.com/office/powerpoint/2010/main" val="3269942683"/>
+        <p14:creationId xmlns:p14="http://schemas.microsoft.com/office/powerpoint/2010/main" val="2371577746"/>
       </p:ext>
     </p:extLst>
   </p:cSld>
@@ -17238,7 +18475,7 @@
 </p:sld>
 </file>
 
-<file path=ppt/slides/slide27.xml><?xml version="1.0" encoding="utf-8"?>
+<file path=ppt/slides/slide30.xml><?xml version="1.0" encoding="utf-8"?>
 <p:sld xmlns:a="http://schemas.openxmlformats.org/drawingml/2006/main" xmlns:r="http://schemas.openxmlformats.org/officeDocument/2006/relationships" xmlns:p="http://schemas.openxmlformats.org/presentationml/2006/main">
   <p:cSld>
     <p:spTree>
@@ -17257,6 +18494,525 @@
       </p:grpSpPr>
       <p:sp>
         <p:nvSpPr>
+          <p:cNvPr id="4" name="標題 2">
+            <a:extLst>
+              <a:ext uri="{FF2B5EF4-FFF2-40B4-BE49-F238E27FC236}">
+                <a16:creationId xmlns:a16="http://schemas.microsoft.com/office/drawing/2014/main" id="{399515DD-8C0A-4AFE-92C0-6C95410AE57C}"/>
+              </a:ext>
+            </a:extLst>
+          </p:cNvPr>
+          <p:cNvSpPr txBox="1">
+            <a:spLocks/>
+          </p:cNvSpPr>
+          <p:nvPr/>
+        </p:nvSpPr>
+        <p:spPr>
+          <a:xfrm>
+            <a:off x="-210785" y="-557253"/>
+            <a:ext cx="10466754" cy="786717"/>
+          </a:xfrm>
+          <a:prstGeom prst="rect">
+            <a:avLst/>
+          </a:prstGeom>
+        </p:spPr>
+        <p:txBody>
+          <a:bodyPr/>
+          <a:lstStyle>
+            <a:defPPr marR="0" lvl="0" algn="l" rtl="0">
+              <a:lnSpc>
+                <a:spcPct val="100000"/>
+              </a:lnSpc>
+              <a:spcBef>
+                <a:spcPts val="0"/>
+              </a:spcBef>
+              <a:spcAft>
+                <a:spcPts val="0"/>
+              </a:spcAft>
+            </a:defPPr>
+            <a:lvl1pPr marR="0" lvl="0" algn="l" rtl="0">
+              <a:lnSpc>
+                <a:spcPct val="100000"/>
+              </a:lnSpc>
+              <a:spcBef>
+                <a:spcPts val="0"/>
+              </a:spcBef>
+              <a:spcAft>
+                <a:spcPts val="0"/>
+              </a:spcAft>
+              <a:buClr>
+                <a:srgbClr val="000000"/>
+              </a:buClr>
+              <a:buFont typeface="Arial"/>
+              <a:defRPr sz="1400" b="0" i="0" u="none" strike="noStrike" cap="none">
+                <a:solidFill>
+                  <a:srgbClr val="000000"/>
+                </a:solidFill>
+                <a:latin typeface="Arial"/>
+                <a:ea typeface="Arial"/>
+                <a:cs typeface="Arial"/>
+                <a:sym typeface="Arial"/>
+              </a:defRPr>
+            </a:lvl1pPr>
+            <a:lvl2pPr marR="0" lvl="1" algn="l" rtl="0">
+              <a:lnSpc>
+                <a:spcPct val="100000"/>
+              </a:lnSpc>
+              <a:spcBef>
+                <a:spcPts val="0"/>
+              </a:spcBef>
+              <a:spcAft>
+                <a:spcPts val="0"/>
+              </a:spcAft>
+              <a:buClr>
+                <a:srgbClr val="000000"/>
+              </a:buClr>
+              <a:buFont typeface="Arial"/>
+              <a:defRPr sz="1400" b="0" i="0" u="none" strike="noStrike" cap="none">
+                <a:solidFill>
+                  <a:srgbClr val="000000"/>
+                </a:solidFill>
+                <a:latin typeface="Arial"/>
+                <a:ea typeface="Arial"/>
+                <a:cs typeface="Arial"/>
+                <a:sym typeface="Arial"/>
+              </a:defRPr>
+            </a:lvl2pPr>
+            <a:lvl3pPr marR="0" lvl="2" algn="l" rtl="0">
+              <a:lnSpc>
+                <a:spcPct val="100000"/>
+              </a:lnSpc>
+              <a:spcBef>
+                <a:spcPts val="0"/>
+              </a:spcBef>
+              <a:spcAft>
+                <a:spcPts val="0"/>
+              </a:spcAft>
+              <a:buClr>
+                <a:srgbClr val="000000"/>
+              </a:buClr>
+              <a:buFont typeface="Arial"/>
+              <a:defRPr sz="1400" b="0" i="0" u="none" strike="noStrike" cap="none">
+                <a:solidFill>
+                  <a:srgbClr val="000000"/>
+                </a:solidFill>
+                <a:latin typeface="Arial"/>
+                <a:ea typeface="Arial"/>
+                <a:cs typeface="Arial"/>
+                <a:sym typeface="Arial"/>
+              </a:defRPr>
+            </a:lvl3pPr>
+            <a:lvl4pPr marR="0" lvl="3" algn="l" rtl="0">
+              <a:lnSpc>
+                <a:spcPct val="100000"/>
+              </a:lnSpc>
+              <a:spcBef>
+                <a:spcPts val="0"/>
+              </a:spcBef>
+              <a:spcAft>
+                <a:spcPts val="0"/>
+              </a:spcAft>
+              <a:buClr>
+                <a:srgbClr val="000000"/>
+              </a:buClr>
+              <a:buFont typeface="Arial"/>
+              <a:defRPr sz="1400" b="0" i="0" u="none" strike="noStrike" cap="none">
+                <a:solidFill>
+                  <a:srgbClr val="000000"/>
+                </a:solidFill>
+                <a:latin typeface="Arial"/>
+                <a:ea typeface="Arial"/>
+                <a:cs typeface="Arial"/>
+                <a:sym typeface="Arial"/>
+              </a:defRPr>
+            </a:lvl4pPr>
+            <a:lvl5pPr marR="0" lvl="4" algn="l" rtl="0">
+              <a:lnSpc>
+                <a:spcPct val="100000"/>
+              </a:lnSpc>
+              <a:spcBef>
+                <a:spcPts val="0"/>
+              </a:spcBef>
+              <a:spcAft>
+                <a:spcPts val="0"/>
+              </a:spcAft>
+              <a:buClr>
+                <a:srgbClr val="000000"/>
+              </a:buClr>
+              <a:buFont typeface="Arial"/>
+              <a:defRPr sz="1400" b="0" i="0" u="none" strike="noStrike" cap="none">
+                <a:solidFill>
+                  <a:srgbClr val="000000"/>
+                </a:solidFill>
+                <a:latin typeface="Arial"/>
+                <a:ea typeface="Arial"/>
+                <a:cs typeface="Arial"/>
+                <a:sym typeface="Arial"/>
+              </a:defRPr>
+            </a:lvl5pPr>
+            <a:lvl6pPr marR="0" lvl="5" algn="l" rtl="0">
+              <a:lnSpc>
+                <a:spcPct val="100000"/>
+              </a:lnSpc>
+              <a:spcBef>
+                <a:spcPts val="0"/>
+              </a:spcBef>
+              <a:spcAft>
+                <a:spcPts val="0"/>
+              </a:spcAft>
+              <a:buClr>
+                <a:srgbClr val="000000"/>
+              </a:buClr>
+              <a:buFont typeface="Arial"/>
+              <a:defRPr sz="1400" b="0" i="0" u="none" strike="noStrike" cap="none">
+                <a:solidFill>
+                  <a:srgbClr val="000000"/>
+                </a:solidFill>
+                <a:latin typeface="Arial"/>
+                <a:ea typeface="Arial"/>
+                <a:cs typeface="Arial"/>
+                <a:sym typeface="Arial"/>
+              </a:defRPr>
+            </a:lvl6pPr>
+            <a:lvl7pPr marR="0" lvl="6" algn="l" rtl="0">
+              <a:lnSpc>
+                <a:spcPct val="100000"/>
+              </a:lnSpc>
+              <a:spcBef>
+                <a:spcPts val="0"/>
+              </a:spcBef>
+              <a:spcAft>
+                <a:spcPts val="0"/>
+              </a:spcAft>
+              <a:buClr>
+                <a:srgbClr val="000000"/>
+              </a:buClr>
+              <a:buFont typeface="Arial"/>
+              <a:defRPr sz="1400" b="0" i="0" u="none" strike="noStrike" cap="none">
+                <a:solidFill>
+                  <a:srgbClr val="000000"/>
+                </a:solidFill>
+                <a:latin typeface="Arial"/>
+                <a:ea typeface="Arial"/>
+                <a:cs typeface="Arial"/>
+                <a:sym typeface="Arial"/>
+              </a:defRPr>
+            </a:lvl7pPr>
+            <a:lvl8pPr marR="0" lvl="7" algn="l" rtl="0">
+              <a:lnSpc>
+                <a:spcPct val="100000"/>
+              </a:lnSpc>
+              <a:spcBef>
+                <a:spcPts val="0"/>
+              </a:spcBef>
+              <a:spcAft>
+                <a:spcPts val="0"/>
+              </a:spcAft>
+              <a:buClr>
+                <a:srgbClr val="000000"/>
+              </a:buClr>
+              <a:buFont typeface="Arial"/>
+              <a:defRPr sz="1400" b="0" i="0" u="none" strike="noStrike" cap="none">
+                <a:solidFill>
+                  <a:srgbClr val="000000"/>
+                </a:solidFill>
+                <a:latin typeface="Arial"/>
+                <a:ea typeface="Arial"/>
+                <a:cs typeface="Arial"/>
+                <a:sym typeface="Arial"/>
+              </a:defRPr>
+            </a:lvl8pPr>
+            <a:lvl9pPr marR="0" lvl="8" algn="l" rtl="0">
+              <a:lnSpc>
+                <a:spcPct val="100000"/>
+              </a:lnSpc>
+              <a:spcBef>
+                <a:spcPts val="0"/>
+              </a:spcBef>
+              <a:spcAft>
+                <a:spcPts val="0"/>
+              </a:spcAft>
+              <a:buClr>
+                <a:srgbClr val="000000"/>
+              </a:buClr>
+              <a:buFont typeface="Arial"/>
+              <a:defRPr sz="1400" b="0" i="0" u="none" strike="noStrike" cap="none">
+                <a:solidFill>
+                  <a:srgbClr val="000000"/>
+                </a:solidFill>
+                <a:latin typeface="Arial"/>
+                <a:ea typeface="Arial"/>
+                <a:cs typeface="Arial"/>
+                <a:sym typeface="Arial"/>
+              </a:defRPr>
+            </a:lvl9pPr>
+          </a:lstStyle>
+          <a:p>
+            <a:r>
+              <a:rPr lang="en-US" altLang="zh-TW"/>
+              <a:t>Tips: </a:t>
+            </a:r>
+            <a:r>
+              <a:rPr lang="zh-TW" altLang="en-US"/>
+              <a:t>如何處理 </a:t>
+            </a:r>
+            <a:r>
+              <a:rPr lang="en-US" altLang="zh-TW"/>
+              <a:t>Windows </a:t>
+            </a:r>
+            <a:r>
+              <a:rPr lang="zh-TW" altLang="en-US"/>
+              <a:t>關機事件</a:t>
+            </a:r>
+            <a:r>
+              <a:rPr lang="en-US" altLang="zh-TW"/>
+              <a:t>?</a:t>
+            </a:r>
+            <a:endParaRPr lang="zh-TW" altLang="en-US" dirty="0"/>
+          </a:p>
+        </p:txBody>
+      </p:sp>
+      <p:pic>
+        <p:nvPicPr>
+          <p:cNvPr id="5" name="圖片 4">
+            <a:extLst>
+              <a:ext uri="{FF2B5EF4-FFF2-40B4-BE49-F238E27FC236}">
+                <a16:creationId xmlns:a16="http://schemas.microsoft.com/office/drawing/2014/main" id="{3992DD95-9313-4023-B873-187F7F6C4D0A}"/>
+              </a:ext>
+            </a:extLst>
+          </p:cNvPr>
+          <p:cNvPicPr>
+            <a:picLocks noChangeAspect="1"/>
+          </p:cNvPicPr>
+          <p:nvPr/>
+        </p:nvPicPr>
+        <p:blipFill>
+          <a:blip r:embed="rId2"/>
+          <a:stretch>
+            <a:fillRect/>
+          </a:stretch>
+        </p:blipFill>
+        <p:spPr>
+          <a:xfrm>
+            <a:off x="907110" y="222637"/>
+            <a:ext cx="7329779" cy="4237763"/>
+          </a:xfrm>
+          <a:prstGeom prst="rect">
+            <a:avLst/>
+          </a:prstGeom>
+        </p:spPr>
+      </p:pic>
+      <p:sp>
+        <p:nvSpPr>
+          <p:cNvPr id="6" name="文字方塊 5">
+            <a:extLst>
+              <a:ext uri="{FF2B5EF4-FFF2-40B4-BE49-F238E27FC236}">
+                <a16:creationId xmlns:a16="http://schemas.microsoft.com/office/drawing/2014/main" id="{03FBC0D9-3D51-4F9B-84CA-095275ED825F}"/>
+              </a:ext>
+            </a:extLst>
+          </p:cNvPr>
+          <p:cNvSpPr txBox="1"/>
+          <p:nvPr/>
+        </p:nvSpPr>
+        <p:spPr>
+          <a:xfrm>
+            <a:off x="150042" y="4542043"/>
+            <a:ext cx="9745100" cy="871008"/>
+          </a:xfrm>
+          <a:prstGeom prst="rect">
+            <a:avLst/>
+          </a:prstGeom>
+          <a:noFill/>
+        </p:spPr>
+        <p:txBody>
+          <a:bodyPr wrap="square" lIns="182880" tIns="146304" rIns="182880" bIns="146304" rtlCol="0">
+            <a:spAutoFit/>
+          </a:bodyPr>
+          <a:lstStyle/>
+          <a:p>
+            <a:pPr>
+              <a:lnSpc>
+                <a:spcPct val="90000"/>
+              </a:lnSpc>
+              <a:spcAft>
+                <a:spcPts val="600"/>
+              </a:spcAft>
+            </a:pPr>
+            <a:r>
+              <a:rPr lang="en-US" altLang="zh-TW" sz="1800" dirty="0">
+                <a:gradFill>
+                  <a:gsLst>
+                    <a:gs pos="2917">
+                      <a:schemeClr val="tx1"/>
+                    </a:gs>
+                    <a:gs pos="30000">
+                      <a:schemeClr val="tx1"/>
+                    </a:gs>
+                  </a:gsLst>
+                  <a:lin ang="5400000" scaled="0"/>
+                </a:gradFill>
+                <a:hlinkClick r:id="rId3"/>
+              </a:rPr>
+              <a:t>https://columns.chicken-house.net/2018/05/10/tips-handle-shutdown-event/</a:t>
+            </a:r>
+            <a:endParaRPr lang="en-US" altLang="zh-TW" sz="1800" dirty="0">
+              <a:gradFill>
+                <a:gsLst>
+                  <a:gs pos="2917">
+                    <a:schemeClr val="tx1"/>
+                  </a:gs>
+                  <a:gs pos="30000">
+                    <a:schemeClr val="tx1"/>
+                  </a:gs>
+                </a:gsLst>
+                <a:lin ang="5400000" scaled="0"/>
+              </a:gradFill>
+            </a:endParaRPr>
+          </a:p>
+          <a:p>
+            <a:pPr>
+              <a:lnSpc>
+                <a:spcPct val="90000"/>
+              </a:lnSpc>
+              <a:spcAft>
+                <a:spcPts val="600"/>
+              </a:spcAft>
+            </a:pPr>
+            <a:endParaRPr lang="zh-TW" altLang="en-US" sz="1800" dirty="0" err="1">
+              <a:gradFill>
+                <a:gsLst>
+                  <a:gs pos="2917">
+                    <a:schemeClr val="tx1"/>
+                  </a:gs>
+                  <a:gs pos="30000">
+                    <a:schemeClr val="tx1"/>
+                  </a:gs>
+                </a:gsLst>
+                <a:lin ang="5400000" scaled="0"/>
+              </a:gradFill>
+            </a:endParaRPr>
+          </a:p>
+        </p:txBody>
+      </p:sp>
+    </p:spTree>
+    <p:extLst>
+      <p:ext uri="{BB962C8B-B14F-4D97-AF65-F5344CB8AC3E}">
+        <p14:creationId xmlns:p14="http://schemas.microsoft.com/office/powerpoint/2010/main" val="89386886"/>
+      </p:ext>
+    </p:extLst>
+  </p:cSld>
+  <p:clrMapOvr>
+    <a:masterClrMapping/>
+  </p:clrMapOvr>
+</p:sld>
+</file>
+
+<file path=ppt/slides/slide31.xml><?xml version="1.0" encoding="utf-8"?>
+<p:sld xmlns:a="http://schemas.openxmlformats.org/drawingml/2006/main" xmlns:r="http://schemas.openxmlformats.org/officeDocument/2006/relationships" xmlns:p="http://schemas.openxmlformats.org/presentationml/2006/main">
+  <p:cSld>
+    <p:spTree>
+      <p:nvGrpSpPr>
+        <p:cNvPr id="1" name=""/>
+        <p:cNvGrpSpPr/>
+        <p:nvPr/>
+      </p:nvGrpSpPr>
+      <p:grpSpPr>
+        <a:xfrm>
+          <a:off x="0" y="0"/>
+          <a:ext cx="0" cy="0"/>
+          <a:chOff x="0" y="0"/>
+          <a:chExt cx="0" cy="0"/>
+        </a:xfrm>
+      </p:grpSpPr>
+      <p:sp>
+        <p:nvSpPr>
+          <p:cNvPr id="2" name="標題 1">
+            <a:extLst>
+              <a:ext uri="{FF2B5EF4-FFF2-40B4-BE49-F238E27FC236}">
+                <a16:creationId xmlns:a16="http://schemas.microsoft.com/office/drawing/2014/main" id="{D7B22318-03C7-42EB-A654-0549C0638542}"/>
+              </a:ext>
+            </a:extLst>
+          </p:cNvPr>
+          <p:cNvSpPr>
+            <a:spLocks noGrp="1"/>
+          </p:cNvSpPr>
+          <p:nvPr>
+            <p:ph type="ctrTitle"/>
+          </p:nvPr>
+        </p:nvSpPr>
+        <p:spPr/>
+        <p:txBody>
+          <a:bodyPr/>
+          <a:lstStyle/>
+          <a:p>
+            <a:r>
+              <a:rPr lang="en-US" altLang="zh-TW" dirty="0"/>
+              <a:t>Demo #4</a:t>
+            </a:r>
+            <a:endParaRPr lang="zh-TW" altLang="en-US" dirty="0"/>
+          </a:p>
+        </p:txBody>
+      </p:sp>
+      <p:sp>
+        <p:nvSpPr>
+          <p:cNvPr id="3" name="副標題 2">
+            <a:extLst>
+              <a:ext uri="{FF2B5EF4-FFF2-40B4-BE49-F238E27FC236}">
+                <a16:creationId xmlns:a16="http://schemas.microsoft.com/office/drawing/2014/main" id="{564BFE7D-4A65-418C-97B8-CB5A74CABC17}"/>
+              </a:ext>
+            </a:extLst>
+          </p:cNvPr>
+          <p:cNvSpPr>
+            <a:spLocks noGrp="1"/>
+          </p:cNvSpPr>
+          <p:nvPr>
+            <p:ph type="subTitle" idx="1"/>
+          </p:nvPr>
+        </p:nvSpPr>
+        <p:spPr/>
+        <p:txBody>
+          <a:bodyPr/>
+          <a:lstStyle/>
+          <a:p>
+            <a:r>
+              <a:rPr lang="en-US" altLang="zh-TW" dirty="0"/>
+              <a:t>Using Docker-Compose</a:t>
+            </a:r>
+            <a:endParaRPr lang="zh-TW" altLang="en-US" dirty="0"/>
+          </a:p>
+        </p:txBody>
+      </p:sp>
+    </p:spTree>
+    <p:extLst>
+      <p:ext uri="{BB962C8B-B14F-4D97-AF65-F5344CB8AC3E}">
+        <p14:creationId xmlns:p14="http://schemas.microsoft.com/office/powerpoint/2010/main" val="341096423"/>
+      </p:ext>
+    </p:extLst>
+  </p:cSld>
+  <p:clrMapOvr>
+    <a:masterClrMapping/>
+  </p:clrMapOvr>
+</p:sld>
+</file>
+
+<file path=ppt/slides/slide32.xml><?xml version="1.0" encoding="utf-8"?>
+<p:sld xmlns:a="http://schemas.openxmlformats.org/drawingml/2006/main" xmlns:r="http://schemas.openxmlformats.org/officeDocument/2006/relationships" xmlns:p="http://schemas.openxmlformats.org/presentationml/2006/main">
+  <p:cSld>
+    <p:spTree>
+      <p:nvGrpSpPr>
+        <p:cNvPr id="1" name=""/>
+        <p:cNvGrpSpPr/>
+        <p:nvPr/>
+      </p:nvGrpSpPr>
+      <p:grpSpPr>
+        <a:xfrm>
+          <a:off x="0" y="0"/>
+          <a:ext cx="0" cy="0"/>
+          <a:chOff x="0" y="0"/>
+          <a:chExt cx="0" cy="0"/>
+        </a:xfrm>
+      </p:grpSpPr>
+      <p:sp>
+        <p:nvSpPr>
           <p:cNvPr id="4" name="標題 3">
             <a:extLst>
               <a:ext uri="{FF2B5EF4-FFF2-40B4-BE49-F238E27FC236}">
@@ -17318,7 +19074,383 @@
 </p:sld>
 </file>
 
-<file path=ppt/slides/slide28.xml><?xml version="1.0" encoding="utf-8"?>
+<file path=ppt/slides/slide33.xml><?xml version="1.0" encoding="utf-8"?>
+<p:sld xmlns:a="http://schemas.openxmlformats.org/drawingml/2006/main" xmlns:r="http://schemas.openxmlformats.org/officeDocument/2006/relationships" xmlns:p="http://schemas.openxmlformats.org/presentationml/2006/main">
+  <p:cSld>
+    <p:spTree>
+      <p:nvGrpSpPr>
+        <p:cNvPr id="1" name=""/>
+        <p:cNvGrpSpPr/>
+        <p:nvPr/>
+      </p:nvGrpSpPr>
+      <p:grpSpPr>
+        <a:xfrm>
+          <a:off x="0" y="0"/>
+          <a:ext cx="0" cy="0"/>
+          <a:chOff x="0" y="0"/>
+          <a:chExt cx="0" cy="0"/>
+        </a:xfrm>
+      </p:grpSpPr>
+      <p:sp>
+        <p:nvSpPr>
+          <p:cNvPr id="2" name="標題 1">
+            <a:extLst>
+              <a:ext uri="{FF2B5EF4-FFF2-40B4-BE49-F238E27FC236}">
+                <a16:creationId xmlns:a16="http://schemas.microsoft.com/office/drawing/2014/main" id="{3536115B-8089-49FD-AB72-1E2BEA47C5BE}"/>
+              </a:ext>
+            </a:extLst>
+          </p:cNvPr>
+          <p:cNvSpPr>
+            <a:spLocks noGrp="1"/>
+          </p:cNvSpPr>
+          <p:nvPr>
+            <p:ph type="ctrTitle"/>
+          </p:nvPr>
+        </p:nvSpPr>
+        <p:spPr/>
+        <p:txBody>
+          <a:bodyPr/>
+          <a:lstStyle/>
+          <a:p>
+            <a:br>
+              <a:rPr lang="en-US" altLang="zh-TW" dirty="0"/>
+            </a:br>
+            <a:r>
+              <a:rPr lang="en-US" altLang="zh-TW" dirty="0"/>
+              <a:t>Question?</a:t>
+            </a:r>
+            <a:endParaRPr lang="zh-TW" altLang="en-US" dirty="0"/>
+          </a:p>
+        </p:txBody>
+      </p:sp>
+      <p:sp>
+        <p:nvSpPr>
+          <p:cNvPr id="3" name="副標題 2">
+            <a:extLst>
+              <a:ext uri="{FF2B5EF4-FFF2-40B4-BE49-F238E27FC236}">
+                <a16:creationId xmlns:a16="http://schemas.microsoft.com/office/drawing/2014/main" id="{5BD6DF8B-1DDE-4009-ADC2-3F9386D7C2AF}"/>
+              </a:ext>
+            </a:extLst>
+          </p:cNvPr>
+          <p:cNvSpPr>
+            <a:spLocks noGrp="1"/>
+          </p:cNvSpPr>
+          <p:nvPr>
+            <p:ph type="subTitle" idx="1"/>
+          </p:nvPr>
+        </p:nvSpPr>
+        <p:spPr/>
+        <p:txBody>
+          <a:bodyPr/>
+          <a:lstStyle/>
+          <a:p>
+            <a:endParaRPr lang="zh-TW" altLang="en-US"/>
+          </a:p>
+        </p:txBody>
+      </p:sp>
+    </p:spTree>
+    <p:extLst>
+      <p:ext uri="{BB962C8B-B14F-4D97-AF65-F5344CB8AC3E}">
+        <p14:creationId xmlns:p14="http://schemas.microsoft.com/office/powerpoint/2010/main" val="1473027774"/>
+      </p:ext>
+    </p:extLst>
+  </p:cSld>
+  <p:clrMapOvr>
+    <a:masterClrMapping/>
+  </p:clrMapOvr>
+</p:sld>
+</file>
+
+<file path=ppt/slides/slide34.xml><?xml version="1.0" encoding="utf-8"?>
+<p:sld xmlns:a="http://schemas.openxmlformats.org/drawingml/2006/main" xmlns:r="http://schemas.openxmlformats.org/officeDocument/2006/relationships" xmlns:p="http://schemas.openxmlformats.org/presentationml/2006/main">
+  <p:cSld>
+    <p:spTree>
+      <p:nvGrpSpPr>
+        <p:cNvPr id="1" name=""/>
+        <p:cNvGrpSpPr/>
+        <p:nvPr/>
+      </p:nvGrpSpPr>
+      <p:grpSpPr>
+        <a:xfrm>
+          <a:off x="0" y="0"/>
+          <a:ext cx="0" cy="0"/>
+          <a:chOff x="0" y="0"/>
+          <a:chExt cx="0" cy="0"/>
+        </a:xfrm>
+      </p:grpSpPr>
+      <p:sp>
+        <p:nvSpPr>
+          <p:cNvPr id="4" name="文字方塊 3">
+            <a:extLst>
+              <a:ext uri="{FF2B5EF4-FFF2-40B4-BE49-F238E27FC236}">
+                <a16:creationId xmlns:a16="http://schemas.microsoft.com/office/drawing/2014/main" id="{DB617E54-C86B-4CC9-B2B9-9493F1901192}"/>
+              </a:ext>
+            </a:extLst>
+          </p:cNvPr>
+          <p:cNvSpPr txBox="1"/>
+          <p:nvPr/>
+        </p:nvSpPr>
+        <p:spPr>
+          <a:xfrm>
+            <a:off x="2526015" y="3301067"/>
+            <a:ext cx="8120916" cy="1822037"/>
+          </a:xfrm>
+          <a:prstGeom prst="rect">
+            <a:avLst/>
+          </a:prstGeom>
+          <a:noFill/>
+        </p:spPr>
+        <p:txBody>
+          <a:bodyPr wrap="square" lIns="182880" tIns="146304" rIns="182880" bIns="146304" rtlCol="0">
+            <a:spAutoFit/>
+          </a:bodyPr>
+          <a:lstStyle/>
+          <a:p>
+            <a:pPr lvl="0" eaLnBrk="0" fontAlgn="base" hangingPunct="0">
+              <a:spcBef>
+                <a:spcPct val="0"/>
+              </a:spcBef>
+              <a:spcAft>
+                <a:spcPct val="0"/>
+              </a:spcAft>
+            </a:pPr>
+            <a:r>
+              <a:rPr lang="zh-TW" altLang="zh-TW" sz="3200" b="1" dirty="0">
+                <a:solidFill>
+                  <a:srgbClr val="1D6682"/>
+                </a:solidFill>
+                <a:latin typeface="Arial" panose="020B0604020202020204" pitchFamily="34" charset="0"/>
+                <a:ea typeface="Open Sans"/>
+              </a:rPr>
+              <a:t>【我們正在招募】</a:t>
+            </a:r>
+            <a:endParaRPr lang="en-US" altLang="zh-TW" sz="2400" dirty="0">
+              <a:solidFill>
+                <a:srgbClr val="1D6682"/>
+              </a:solidFill>
+              <a:latin typeface="Arial" panose="020B0604020202020204" pitchFamily="34" charset="0"/>
+            </a:endParaRPr>
+          </a:p>
+          <a:p>
+            <a:pPr lvl="0" eaLnBrk="0" fontAlgn="base" hangingPunct="0">
+              <a:spcBef>
+                <a:spcPct val="0"/>
+              </a:spcBef>
+              <a:spcAft>
+                <a:spcPct val="0"/>
+              </a:spcAft>
+            </a:pPr>
+            <a:r>
+              <a:rPr lang="zh-TW" altLang="zh-TW" sz="2400" dirty="0">
+                <a:solidFill>
+                  <a:srgbClr val="1D6682"/>
+                </a:solidFill>
+                <a:latin typeface="Arial" panose="020B0604020202020204" pitchFamily="34" charset="0"/>
+              </a:rPr>
+              <a:t>● </a:t>
+            </a:r>
+            <a:r>
+              <a:rPr lang="zh-TW" altLang="zh-TW" sz="2400" dirty="0">
+                <a:solidFill>
+                  <a:srgbClr val="FF8C1D"/>
+                </a:solidFill>
+                <a:latin typeface="Arial" panose="020B0604020202020204" pitchFamily="34" charset="0"/>
+                <a:hlinkClick r:id="rId2"/>
+              </a:rPr>
+              <a:t>架構師</a:t>
+            </a:r>
+            <a:endParaRPr lang="zh-TW" altLang="zh-TW" sz="3600" dirty="0">
+              <a:latin typeface="Arial" panose="020B0604020202020204" pitchFamily="34" charset="0"/>
+            </a:endParaRPr>
+          </a:p>
+          <a:p>
+            <a:pPr>
+              <a:lnSpc>
+                <a:spcPct val="90000"/>
+              </a:lnSpc>
+              <a:spcAft>
+                <a:spcPts val="600"/>
+              </a:spcAft>
+            </a:pPr>
+            <a:r>
+              <a:rPr lang="zh-TW" altLang="zh-TW" sz="2400" dirty="0">
+                <a:solidFill>
+                  <a:srgbClr val="1D6682"/>
+                </a:solidFill>
+                <a:latin typeface="Arial" panose="020B0604020202020204" pitchFamily="34" charset="0"/>
+              </a:rPr>
+              <a:t>● </a:t>
+            </a:r>
+            <a:r>
+              <a:rPr lang="zh-TW" altLang="zh-TW" sz="2400" dirty="0">
+                <a:solidFill>
+                  <a:srgbClr val="FF8C1D"/>
+                </a:solidFill>
+                <a:latin typeface="Arial" panose="020B0604020202020204" pitchFamily="34" charset="0"/>
+                <a:hlinkClick r:id="rId3"/>
+              </a:rPr>
+              <a:t>C# Asp.Net MVC開發工程師</a:t>
+            </a:r>
+            <a:br>
+              <a:rPr lang="zh-TW" altLang="zh-TW" sz="2400" dirty="0">
+                <a:solidFill>
+                  <a:srgbClr val="1D6682"/>
+                </a:solidFill>
+                <a:latin typeface="Arial" panose="020B0604020202020204" pitchFamily="34" charset="0"/>
+              </a:rPr>
+            </a:br>
+            <a:endParaRPr lang="zh-TW" altLang="en-US" sz="2400" dirty="0">
+              <a:gradFill>
+                <a:gsLst>
+                  <a:gs pos="2917">
+                    <a:schemeClr val="tx1"/>
+                  </a:gs>
+                  <a:gs pos="30000">
+                    <a:schemeClr val="tx1"/>
+                  </a:gs>
+                </a:gsLst>
+                <a:lin ang="5400000" scaled="0"/>
+              </a:gradFill>
+            </a:endParaRPr>
+          </a:p>
+        </p:txBody>
+      </p:sp>
+      <p:sp>
+        <p:nvSpPr>
+          <p:cNvPr id="5" name="文字方塊 4">
+            <a:extLst>
+              <a:ext uri="{FF2B5EF4-FFF2-40B4-BE49-F238E27FC236}">
+                <a16:creationId xmlns:a16="http://schemas.microsoft.com/office/drawing/2014/main" id="{38E6C06F-8053-48B5-A38E-5A1AE5F6DDFB}"/>
+              </a:ext>
+            </a:extLst>
+          </p:cNvPr>
+          <p:cNvSpPr txBox="1"/>
+          <p:nvPr/>
+        </p:nvSpPr>
+        <p:spPr>
+          <a:xfrm>
+            <a:off x="0" y="4604500"/>
+            <a:ext cx="4803623" cy="1037207"/>
+          </a:xfrm>
+          <a:prstGeom prst="rect">
+            <a:avLst/>
+          </a:prstGeom>
+          <a:noFill/>
+        </p:spPr>
+        <p:txBody>
+          <a:bodyPr wrap="none" lIns="182880" tIns="146304" rIns="182880" bIns="146304" rtlCol="0">
+            <a:spAutoFit/>
+          </a:bodyPr>
+          <a:lstStyle/>
+          <a:p>
+            <a:pPr>
+              <a:lnSpc>
+                <a:spcPct val="90000"/>
+              </a:lnSpc>
+              <a:spcAft>
+                <a:spcPts val="600"/>
+              </a:spcAft>
+            </a:pPr>
+            <a:r>
+              <a:rPr lang="en-US" altLang="zh-TW" sz="2400" dirty="0">
+                <a:gradFill>
+                  <a:gsLst>
+                    <a:gs pos="2917">
+                      <a:schemeClr val="tx1"/>
+                    </a:gs>
+                    <a:gs pos="30000">
+                      <a:schemeClr val="tx1"/>
+                    </a:gs>
+                  </a:gsLst>
+                  <a:lin ang="5400000" scaled="0"/>
+                </a:gradFill>
+                <a:hlinkClick r:id="rId4"/>
+              </a:rPr>
+              <a:t>https://www.91app.com/careers/</a:t>
+            </a:r>
+            <a:endParaRPr lang="en-US" altLang="zh-TW" sz="2400" dirty="0">
+              <a:gradFill>
+                <a:gsLst>
+                  <a:gs pos="2917">
+                    <a:schemeClr val="tx1"/>
+                  </a:gs>
+                  <a:gs pos="30000">
+                    <a:schemeClr val="tx1"/>
+                  </a:gs>
+                </a:gsLst>
+                <a:lin ang="5400000" scaled="0"/>
+              </a:gradFill>
+            </a:endParaRPr>
+          </a:p>
+          <a:p>
+            <a:pPr>
+              <a:lnSpc>
+                <a:spcPct val="90000"/>
+              </a:lnSpc>
+              <a:spcAft>
+                <a:spcPts val="600"/>
+              </a:spcAft>
+            </a:pPr>
+            <a:endParaRPr lang="zh-TW" altLang="en-US" sz="2400" dirty="0" err="1">
+              <a:gradFill>
+                <a:gsLst>
+                  <a:gs pos="2917">
+                    <a:schemeClr val="tx1"/>
+                  </a:gs>
+                  <a:gs pos="30000">
+                    <a:schemeClr val="tx1"/>
+                  </a:gs>
+                </a:gsLst>
+                <a:lin ang="5400000" scaled="0"/>
+              </a:gradFill>
+            </a:endParaRPr>
+          </a:p>
+        </p:txBody>
+      </p:sp>
+      <p:pic>
+        <p:nvPicPr>
+          <p:cNvPr id="6" name="圖片 5">
+            <a:extLst>
+              <a:ext uri="{FF2B5EF4-FFF2-40B4-BE49-F238E27FC236}">
+                <a16:creationId xmlns:a16="http://schemas.microsoft.com/office/drawing/2014/main" id="{4F6C7FA2-20EB-4E5E-930C-878BA482AB4B}"/>
+              </a:ext>
+            </a:extLst>
+          </p:cNvPr>
+          <p:cNvPicPr>
+            <a:picLocks noChangeAspect="1"/>
+          </p:cNvPicPr>
+          <p:nvPr/>
+        </p:nvPicPr>
+        <p:blipFill>
+          <a:blip r:embed="rId5"/>
+          <a:stretch>
+            <a:fillRect/>
+          </a:stretch>
+        </p:blipFill>
+        <p:spPr>
+          <a:xfrm>
+            <a:off x="0" y="1"/>
+            <a:ext cx="9144000" cy="3301066"/>
+          </a:xfrm>
+          <a:prstGeom prst="rect">
+            <a:avLst/>
+          </a:prstGeom>
+        </p:spPr>
+      </p:pic>
+    </p:spTree>
+    <p:extLst>
+      <p:ext uri="{BB962C8B-B14F-4D97-AF65-F5344CB8AC3E}">
+        <p14:creationId xmlns:p14="http://schemas.microsoft.com/office/powerpoint/2010/main" val="1951645078"/>
+      </p:ext>
+    </p:extLst>
+  </p:cSld>
+  <p:clrMapOvr>
+    <a:masterClrMapping/>
+  </p:clrMapOvr>
+</p:sld>
+</file>
+
+<file path=ppt/slides/slide35.xml><?xml version="1.0" encoding="utf-8"?>
 <p:sld xmlns:a="http://schemas.openxmlformats.org/drawingml/2006/main" xmlns:r="http://schemas.openxmlformats.org/officeDocument/2006/relationships" xmlns:p="http://schemas.openxmlformats.org/presentationml/2006/main">
   <p:cSld>
     <p:bg>
@@ -17917,140 +20049,6 @@
     <p:extLst>
       <p:ext uri="{BB962C8B-B14F-4D97-AF65-F5344CB8AC3E}">
         <p14:creationId xmlns:p14="http://schemas.microsoft.com/office/powerpoint/2010/main" val="3435798180"/>
-      </p:ext>
-    </p:extLst>
-  </p:cSld>
-  <p:clrMapOvr>
-    <a:masterClrMapping/>
-  </p:clrMapOvr>
-</p:sld>
-</file>
-
-<file path=ppt/slides/slide3.xml><?xml version="1.0" encoding="utf-8"?>
-<p:sld xmlns:a="http://schemas.openxmlformats.org/drawingml/2006/main" xmlns:r="http://schemas.openxmlformats.org/officeDocument/2006/relationships" xmlns:p="http://schemas.openxmlformats.org/presentationml/2006/main">
-  <p:cSld>
-    <p:spTree>
-      <p:nvGrpSpPr>
-        <p:cNvPr id="1" name=""/>
-        <p:cNvGrpSpPr/>
-        <p:nvPr/>
-      </p:nvGrpSpPr>
-      <p:grpSpPr>
-        <a:xfrm>
-          <a:off x="0" y="0"/>
-          <a:ext cx="0" cy="0"/>
-          <a:chOff x="0" y="0"/>
-          <a:chExt cx="0" cy="0"/>
-        </a:xfrm>
-      </p:grpSpPr>
-      <p:sp>
-        <p:nvSpPr>
-          <p:cNvPr id="4" name="標題 3">
-            <a:extLst>
-              <a:ext uri="{FF2B5EF4-FFF2-40B4-BE49-F238E27FC236}">
-                <a16:creationId xmlns:a16="http://schemas.microsoft.com/office/drawing/2014/main" id="{35CCDDFD-F728-4A0B-89D6-D80A3CFAE7E5}"/>
-              </a:ext>
-            </a:extLst>
-          </p:cNvPr>
-          <p:cNvSpPr>
-            <a:spLocks noGrp="1"/>
-          </p:cNvSpPr>
-          <p:nvPr>
-            <p:ph type="title"/>
-          </p:nvPr>
-        </p:nvSpPr>
-        <p:spPr/>
-        <p:txBody>
-          <a:bodyPr/>
-          <a:lstStyle/>
-          <a:p>
-            <a:r>
-              <a:rPr lang="en-US" dirty="0"/>
-              <a:t>.NET Microservices</a:t>
-            </a:r>
-          </a:p>
-        </p:txBody>
-      </p:sp>
-      <p:pic>
-        <p:nvPicPr>
-          <p:cNvPr id="3074" name="Picture 2" descr="æ¸ç±å°é¢">
-            <a:extLst>
-              <a:ext uri="{FF2B5EF4-FFF2-40B4-BE49-F238E27FC236}">
-                <a16:creationId xmlns:a16="http://schemas.microsoft.com/office/drawing/2014/main" id="{ED20BB43-9698-4A94-8AE6-EE7250533D14}"/>
-              </a:ext>
-            </a:extLst>
-          </p:cNvPr>
-          <p:cNvPicPr>
-            <a:picLocks noChangeAspect="1" noChangeArrowheads="1"/>
-          </p:cNvPicPr>
-          <p:nvPr/>
-        </p:nvPicPr>
-        <p:blipFill>
-          <a:blip r:embed="rId2">
-            <a:extLst>
-              <a:ext uri="{28A0092B-C50C-407E-A947-70E740481C1C}">
-                <a14:useLocalDpi xmlns:a14="http://schemas.microsoft.com/office/drawing/2010/main" val="0"/>
-              </a:ext>
-            </a:extLst>
-          </a:blip>
-          <a:srcRect/>
-          <a:stretch>
-            <a:fillRect/>
-          </a:stretch>
-        </p:blipFill>
-        <p:spPr bwMode="auto">
-          <a:xfrm>
-            <a:off x="799980" y="1350816"/>
-            <a:ext cx="2647950" cy="3429000"/>
-          </a:xfrm>
-          <a:prstGeom prst="rect">
-            <a:avLst/>
-          </a:prstGeom>
-          <a:noFill/>
-          <a:extLst>
-            <a:ext uri="{909E8E84-426E-40DD-AFC4-6F175D3DCCD1}">
-              <a14:hiddenFill xmlns:a14="http://schemas.microsoft.com/office/drawing/2010/main">
-                <a:solidFill>
-                  <a:srgbClr val="FFFFFF"/>
-                </a:solidFill>
-              </a14:hiddenFill>
-            </a:ext>
-          </a:extLst>
-        </p:spPr>
-      </p:pic>
-      <p:pic>
-        <p:nvPicPr>
-          <p:cNvPr id="6" name="圖片 5">
-            <a:extLst>
-              <a:ext uri="{FF2B5EF4-FFF2-40B4-BE49-F238E27FC236}">
-                <a16:creationId xmlns:a16="http://schemas.microsoft.com/office/drawing/2014/main" id="{5E342272-D16A-4FD3-A99A-59F25B32D304}"/>
-              </a:ext>
-            </a:extLst>
-          </p:cNvPr>
-          <p:cNvPicPr>
-            <a:picLocks noChangeAspect="1"/>
-          </p:cNvPicPr>
-          <p:nvPr/>
-        </p:nvPicPr>
-        <p:blipFill rotWithShape="1">
-          <a:blip r:embed="rId3"/>
-          <a:srcRect b="29142"/>
-          <a:stretch/>
-        </p:blipFill>
-        <p:spPr>
-          <a:xfrm>
-            <a:off x="4347622" y="1243027"/>
-            <a:ext cx="3082247" cy="3644579"/>
-          </a:xfrm>
-          <a:prstGeom prst="rect">
-            <a:avLst/>
-          </a:prstGeom>
-        </p:spPr>
-      </p:pic>
-    </p:spTree>
-    <p:extLst>
-      <p:ext uri="{BB962C8B-B14F-4D97-AF65-F5344CB8AC3E}">
-        <p14:creationId xmlns:p14="http://schemas.microsoft.com/office/powerpoint/2010/main" val="2371577746"/>
       </p:ext>
     </p:extLst>
   </p:cSld>

</xml_diff>